<commit_message>
Clean up slide master
</commit_message>
<xml_diff>
--- a/WhatIsdotNET/WhatIsdotNET.pptx
+++ b/WhatIsdotNET/WhatIsdotNET.pptx
@@ -7,6 +7,9 @@
   <p:notesMasterIdLst>
     <p:notesMasterId r:id="rId27"/>
   </p:notesMasterIdLst>
+  <p:handoutMasterIdLst>
+    <p:handoutMasterId r:id="rId28"/>
+  </p:handoutMasterIdLst>
   <p:sldIdLst>
     <p:sldId id="308" r:id="rId5"/>
     <p:sldId id="317" r:id="rId6"/>
@@ -6997,6 +7000,195 @@
 </dgm:styleDef>
 </file>
 
+<file path=ppt/handoutMasters/handoutMaster1.xml><?xml version="1.0" encoding="utf-8"?>
+<p:handoutMaster xmlns:a="http://schemas.openxmlformats.org/drawingml/2006/main" xmlns:r="http://schemas.openxmlformats.org/officeDocument/2006/relationships" xmlns:p="http://schemas.openxmlformats.org/presentationml/2006/main">
+  <p:cSld>
+    <p:bg>
+      <p:bgRef idx="1001">
+        <a:schemeClr val="bg1"/>
+      </p:bgRef>
+    </p:bg>
+    <p:spTree>
+      <p:nvGrpSpPr>
+        <p:cNvPr id="1" name=""/>
+        <p:cNvGrpSpPr/>
+        <p:nvPr/>
+      </p:nvGrpSpPr>
+      <p:grpSpPr>
+        <a:xfrm>
+          <a:off x="0" y="0"/>
+          <a:ext cx="0" cy="0"/>
+          <a:chOff x="0" y="0"/>
+          <a:chExt cx="0" cy="0"/>
+        </a:xfrm>
+      </p:grpSpPr>
+      <p:sp>
+        <p:nvSpPr>
+          <p:cNvPr id="2" name="Header Placeholder 1">
+            <a:extLst>
+              <a:ext uri="{FF2B5EF4-FFF2-40B4-BE49-F238E27FC236}">
+                <a16:creationId xmlns:a16="http://schemas.microsoft.com/office/drawing/2014/main" id="{FB109183-6A97-499C-A537-A98260FD926B}"/>
+              </a:ext>
+            </a:extLst>
+          </p:cNvPr>
+          <p:cNvSpPr>
+            <a:spLocks noGrp="1"/>
+          </p:cNvSpPr>
+          <p:nvPr>
+            <p:ph type="hdr" sz="quarter"/>
+          </p:nvPr>
+        </p:nvSpPr>
+        <p:spPr>
+          <a:xfrm>
+            <a:off x="0" y="0"/>
+            <a:ext cx="3170238" cy="481013"/>
+          </a:xfrm>
+          <a:prstGeom prst="rect">
+            <a:avLst/>
+          </a:prstGeom>
+        </p:spPr>
+        <p:txBody>
+          <a:bodyPr vert="horz" lIns="91440" tIns="45720" rIns="91440" bIns="45720" rtlCol="0"/>
+          <a:lstStyle>
+            <a:lvl1pPr algn="l">
+              <a:defRPr sz="1200"/>
+            </a:lvl1pPr>
+          </a:lstStyle>
+          <a:p>
+            <a:endParaRPr lang="en-US"/>
+          </a:p>
+        </p:txBody>
+      </p:sp>
+      <p:sp>
+        <p:nvSpPr>
+          <p:cNvPr id="3" name="Date Placeholder 2">
+            <a:extLst>
+              <a:ext uri="{FF2B5EF4-FFF2-40B4-BE49-F238E27FC236}">
+                <a16:creationId xmlns:a16="http://schemas.microsoft.com/office/drawing/2014/main" id="{8B7B27EE-C43D-48BC-BE7F-8AA923ADF511}"/>
+              </a:ext>
+            </a:extLst>
+          </p:cNvPr>
+          <p:cNvSpPr>
+            <a:spLocks noGrp="1"/>
+          </p:cNvSpPr>
+          <p:nvPr>
+            <p:ph type="dt" sz="quarter" idx="1"/>
+          </p:nvPr>
+        </p:nvSpPr>
+        <p:spPr>
+          <a:xfrm>
+            <a:off x="4143375" y="0"/>
+            <a:ext cx="3170238" cy="481013"/>
+          </a:xfrm>
+          <a:prstGeom prst="rect">
+            <a:avLst/>
+          </a:prstGeom>
+        </p:spPr>
+        <p:txBody>
+          <a:bodyPr vert="horz" lIns="91440" tIns="45720" rIns="91440" bIns="45720" rtlCol="0"/>
+          <a:lstStyle>
+            <a:lvl1pPr algn="r">
+              <a:defRPr sz="1200"/>
+            </a:lvl1pPr>
+          </a:lstStyle>
+          <a:p>
+            <a:fld id="{6A4A805B-461C-4670-9402-81E801250286}" type="datetimeFigureOut">
+              <a:rPr lang="en-US" smtClean="0"/>
+              <a:t>3/20/2018</a:t>
+            </a:fld>
+            <a:endParaRPr lang="en-US"/>
+          </a:p>
+        </p:txBody>
+      </p:sp>
+      <p:sp>
+        <p:nvSpPr>
+          <p:cNvPr id="4" name="Footer Placeholder 3">
+            <a:extLst>
+              <a:ext uri="{FF2B5EF4-FFF2-40B4-BE49-F238E27FC236}">
+                <a16:creationId xmlns:a16="http://schemas.microsoft.com/office/drawing/2014/main" id="{ECE6E46E-E7C4-451B-8240-39427C18E875}"/>
+              </a:ext>
+            </a:extLst>
+          </p:cNvPr>
+          <p:cNvSpPr>
+            <a:spLocks noGrp="1"/>
+          </p:cNvSpPr>
+          <p:nvPr>
+            <p:ph type="ftr" sz="quarter" idx="2"/>
+          </p:nvPr>
+        </p:nvSpPr>
+        <p:spPr>
+          <a:xfrm>
+            <a:off x="0" y="9120188"/>
+            <a:ext cx="3170238" cy="481012"/>
+          </a:xfrm>
+          <a:prstGeom prst="rect">
+            <a:avLst/>
+          </a:prstGeom>
+        </p:spPr>
+        <p:txBody>
+          <a:bodyPr vert="horz" lIns="91440" tIns="45720" rIns="91440" bIns="45720" rtlCol="0" anchor="b"/>
+          <a:lstStyle>
+            <a:lvl1pPr algn="l">
+              <a:defRPr sz="1200"/>
+            </a:lvl1pPr>
+          </a:lstStyle>
+          <a:p>
+            <a:endParaRPr lang="en-US"/>
+          </a:p>
+        </p:txBody>
+      </p:sp>
+      <p:sp>
+        <p:nvSpPr>
+          <p:cNvPr id="5" name="Slide Number Placeholder 4">
+            <a:extLst>
+              <a:ext uri="{FF2B5EF4-FFF2-40B4-BE49-F238E27FC236}">
+                <a16:creationId xmlns:a16="http://schemas.microsoft.com/office/drawing/2014/main" id="{83B97971-52EE-4BDD-A93C-B1B507E4CC55}"/>
+              </a:ext>
+            </a:extLst>
+          </p:cNvPr>
+          <p:cNvSpPr>
+            <a:spLocks noGrp="1"/>
+          </p:cNvSpPr>
+          <p:nvPr>
+            <p:ph type="sldNum" sz="quarter" idx="3"/>
+          </p:nvPr>
+        </p:nvSpPr>
+        <p:spPr>
+          <a:xfrm>
+            <a:off x="4143375" y="9120188"/>
+            <a:ext cx="3170238" cy="481012"/>
+          </a:xfrm>
+          <a:prstGeom prst="rect">
+            <a:avLst/>
+          </a:prstGeom>
+        </p:spPr>
+        <p:txBody>
+          <a:bodyPr vert="horz" lIns="91440" tIns="45720" rIns="91440" bIns="45720" rtlCol="0" anchor="b"/>
+          <a:lstStyle>
+            <a:lvl1pPr algn="r">
+              <a:defRPr sz="1200"/>
+            </a:lvl1pPr>
+          </a:lstStyle>
+          <a:p>
+            <a:fld id="{BE7A608B-A52C-471B-B76C-638862CCF1D6}" type="slidenum">
+              <a:rPr lang="en-US" smtClean="0"/>
+              <a:t>‹#›</a:t>
+            </a:fld>
+            <a:endParaRPr lang="en-US"/>
+          </a:p>
+        </p:txBody>
+      </p:sp>
+    </p:spTree>
+    <p:extLst>
+      <p:ext uri="{BB962C8B-B14F-4D97-AF65-F5344CB8AC3E}">
+        <p14:creationId xmlns:p14="http://schemas.microsoft.com/office/powerpoint/2010/main" val="4237052554"/>
+      </p:ext>
+    </p:extLst>
+  </p:cSld>
+  <p:clrMap bg1="lt1" tx1="dk1" bg2="lt2" tx2="dk2" accent1="accent1" accent2="accent2" accent3="accent3" accent4="accent4" accent5="accent5" accent6="accent6" hlink="hlink" folHlink="folHlink"/>
+</p:handoutMaster>
+</file>
+
 <file path=ppt/notesMasters/notesMaster1.xml><?xml version="1.0" encoding="utf-8"?>
 <p:notesMaster xmlns:a="http://schemas.openxmlformats.org/drawingml/2006/main" xmlns:r="http://schemas.openxmlformats.org/officeDocument/2006/relationships" xmlns:p="http://schemas.openxmlformats.org/presentationml/2006/main">
   <p:cSld>
@@ -7019,72 +7211,6 @@
           <a:chExt cx="0" cy="0"/>
         </a:xfrm>
       </p:grpSpPr>
-      <p:sp>
-        <p:nvSpPr>
-          <p:cNvPr id="2" name="Header Placeholder 1"/>
-          <p:cNvSpPr>
-            <a:spLocks noGrp="1"/>
-          </p:cNvSpPr>
-          <p:nvPr>
-            <p:ph type="hdr" sz="quarter"/>
-          </p:nvPr>
-        </p:nvSpPr>
-        <p:spPr>
-          <a:xfrm>
-            <a:off x="0" y="0"/>
-            <a:ext cx="3169920" cy="481727"/>
-          </a:xfrm>
-          <a:prstGeom prst="rect">
-            <a:avLst/>
-          </a:prstGeom>
-        </p:spPr>
-        <p:txBody>
-          <a:bodyPr vert="horz" lIns="96661" tIns="48331" rIns="96661" bIns="48331" rtlCol="0"/>
-          <a:lstStyle>
-            <a:lvl1pPr algn="l">
-              <a:defRPr sz="1300"/>
-            </a:lvl1pPr>
-          </a:lstStyle>
-          <a:p>
-            <a:endParaRPr lang="en-US"/>
-          </a:p>
-        </p:txBody>
-      </p:sp>
-      <p:sp>
-        <p:nvSpPr>
-          <p:cNvPr id="3" name="Date Placeholder 2"/>
-          <p:cNvSpPr>
-            <a:spLocks noGrp="1"/>
-          </p:cNvSpPr>
-          <p:nvPr>
-            <p:ph type="dt" idx="1"/>
-          </p:nvPr>
-        </p:nvSpPr>
-        <p:spPr>
-          <a:xfrm>
-            <a:off x="4143587" y="0"/>
-            <a:ext cx="3169920" cy="481727"/>
-          </a:xfrm>
-          <a:prstGeom prst="rect">
-            <a:avLst/>
-          </a:prstGeom>
-        </p:spPr>
-        <p:txBody>
-          <a:bodyPr vert="horz" lIns="96661" tIns="48331" rIns="96661" bIns="48331" rtlCol="0"/>
-          <a:lstStyle>
-            <a:lvl1pPr algn="r">
-              <a:defRPr sz="1300"/>
-            </a:lvl1pPr>
-          </a:lstStyle>
-          <a:p>
-            <a:fld id="{18438622-0837-4E9E-A16C-0B0206CE676E}" type="datetimeFigureOut">
-              <a:rPr lang="en-US" smtClean="0"/>
-              <a:t>3/20/2018</a:t>
-            </a:fld>
-            <a:endParaRPr lang="en-US"/>
-          </a:p>
-        </p:txBody>
-      </p:sp>
       <p:sp>
         <p:nvSpPr>
           <p:cNvPr id="4" name="Slide Image Placeholder 3"/>
@@ -7179,37 +7305,6 @@
       </p:sp>
       <p:sp>
         <p:nvSpPr>
-          <p:cNvPr id="6" name="Footer Placeholder 5"/>
-          <p:cNvSpPr>
-            <a:spLocks noGrp="1"/>
-          </p:cNvSpPr>
-          <p:nvPr>
-            <p:ph type="ftr" sz="quarter" idx="4"/>
-          </p:nvPr>
-        </p:nvSpPr>
-        <p:spPr>
-          <a:xfrm>
-            <a:off x="0" y="9119474"/>
-            <a:ext cx="3169920" cy="481726"/>
-          </a:xfrm>
-          <a:prstGeom prst="rect">
-            <a:avLst/>
-          </a:prstGeom>
-        </p:spPr>
-        <p:txBody>
-          <a:bodyPr vert="horz" lIns="96661" tIns="48331" rIns="96661" bIns="48331" rtlCol="0" anchor="b"/>
-          <a:lstStyle>
-            <a:lvl1pPr algn="l">
-              <a:defRPr sz="1300"/>
-            </a:lvl1pPr>
-          </a:lstStyle>
-          <a:p>
-            <a:endParaRPr lang="en-US"/>
-          </a:p>
-        </p:txBody>
-      </p:sp>
-      <p:sp>
-        <p:nvSpPr>
           <p:cNvPr id="7" name="Slide Number Placeholder 6"/>
           <p:cNvSpPr>
             <a:spLocks noGrp="1"/>
@@ -7240,6 +7335,49 @@
               <a:t>‹#›</a:t>
             </a:fld>
             <a:endParaRPr lang="en-US"/>
+          </a:p>
+        </p:txBody>
+      </p:sp>
+      <p:sp>
+        <p:nvSpPr>
+          <p:cNvPr id="11" name="Header Placeholder 10">
+            <a:extLst>
+              <a:ext uri="{FF2B5EF4-FFF2-40B4-BE49-F238E27FC236}">
+                <a16:creationId xmlns:a16="http://schemas.microsoft.com/office/drawing/2014/main" id="{C6085E80-0CA6-429A-827F-050AA72B63D6}"/>
+              </a:ext>
+            </a:extLst>
+          </p:cNvPr>
+          <p:cNvSpPr>
+            <a:spLocks noGrp="1"/>
+          </p:cNvSpPr>
+          <p:nvPr>
+            <p:ph type="hdr" sz="quarter"/>
+          </p:nvPr>
+        </p:nvSpPr>
+        <p:spPr>
+          <a:xfrm>
+            <a:off x="0" y="0"/>
+            <a:ext cx="3170238" cy="481013"/>
+          </a:xfrm>
+          <a:prstGeom prst="rect">
+            <a:avLst/>
+          </a:prstGeom>
+        </p:spPr>
+        <p:txBody>
+          <a:bodyPr vert="horz" lIns="91440" tIns="45720" rIns="91440" bIns="45720" rtlCol="0"/>
+          <a:lstStyle>
+            <a:lvl1pPr algn="l">
+              <a:defRPr sz="1200"/>
+            </a:lvl1pPr>
+          </a:lstStyle>
+          <a:p>
+            <a:r>
+              <a:rPr lang="en-US" dirty="0"/>
+              <a:t>https://github.com/dotnet-presentations/home</a:t>
+            </a:r>
+          </a:p>
+          <a:p>
+            <a:endParaRPr lang="en-US" dirty="0"/>
           </a:p>
         </p:txBody>
       </p:sp>
@@ -7390,10 +7528,7 @@
           <a:bodyPr/>
           <a:lstStyle/>
           <a:p>
-            <a:r>
-              <a:rPr lang="en-US" dirty="0"/>
-              <a:t>So what is .NET?</a:t>
-            </a:r>
+            <a:endParaRPr lang="en-US" dirty="0"/>
           </a:p>
         </p:txBody>
       </p:sp>
@@ -7433,6 +7568,49 @@
               </a:solidFill>
               <a:latin typeface="Calibri" panose="020F0502020204030204"/>
             </a:endParaRPr>
+          </a:p>
+        </p:txBody>
+      </p:sp>
+      <p:sp>
+        <p:nvSpPr>
+          <p:cNvPr id="8" name="Header Placeholder 10">
+            <a:extLst>
+              <a:ext uri="{FF2B5EF4-FFF2-40B4-BE49-F238E27FC236}">
+                <a16:creationId xmlns:a16="http://schemas.microsoft.com/office/drawing/2014/main" id="{2D783C66-F127-46DC-9F52-CFBF74E00FBD}"/>
+              </a:ext>
+            </a:extLst>
+          </p:cNvPr>
+          <p:cNvSpPr>
+            <a:spLocks noGrp="1"/>
+          </p:cNvSpPr>
+          <p:nvPr>
+            <p:ph type="hdr" sz="quarter"/>
+          </p:nvPr>
+        </p:nvSpPr>
+        <p:spPr>
+          <a:xfrm>
+            <a:off x="0" y="0"/>
+            <a:ext cx="3170238" cy="481013"/>
+          </a:xfrm>
+          <a:prstGeom prst="rect">
+            <a:avLst/>
+          </a:prstGeom>
+        </p:spPr>
+        <p:txBody>
+          <a:bodyPr vert="horz" lIns="91440" tIns="45720" rIns="91440" bIns="45720" rtlCol="0"/>
+          <a:lstStyle>
+            <a:lvl1pPr algn="l">
+              <a:defRPr sz="1200"/>
+            </a:lvl1pPr>
+          </a:lstStyle>
+          <a:p>
+            <a:r>
+              <a:rPr lang="en-US" dirty="0"/>
+              <a:t>https://github.com/dotnet-presentations/home</a:t>
+            </a:r>
+          </a:p>
+          <a:p>
+            <a:endParaRPr lang="en-US" dirty="0"/>
           </a:p>
         </p:txBody>
       </p:sp>
@@ -7520,115 +7698,6 @@
       </p:sp>
       <p:sp>
         <p:nvSpPr>
-          <p:cNvPr id="4" name="Header Placeholder 3"/>
-          <p:cNvSpPr>
-            <a:spLocks noGrp="1"/>
-          </p:cNvSpPr>
-          <p:nvPr>
-            <p:ph type="hdr" sz="quarter" idx="10"/>
-          </p:nvPr>
-        </p:nvSpPr>
-        <p:spPr/>
-        <p:txBody>
-          <a:bodyPr/>
-          <a:lstStyle/>
-          <a:p>
-            <a:pPr defTabSz="1004735">
-              <a:defRPr/>
-            </a:pPr>
-            <a:r>
-              <a:rPr lang="en-US">
-                <a:solidFill>
-                  <a:prstClr val="black"/>
-                </a:solidFill>
-                <a:latin typeface="Calibri" panose="020F0502020204030204"/>
-              </a:rPr>
-              <a:t>Microsoft Connect 2016</a:t>
-            </a:r>
-          </a:p>
-        </p:txBody>
-      </p:sp>
-      <p:sp>
-        <p:nvSpPr>
-          <p:cNvPr id="5" name="Footer Placeholder 4"/>
-          <p:cNvSpPr>
-            <a:spLocks noGrp="1"/>
-          </p:cNvSpPr>
-          <p:nvPr>
-            <p:ph type="ftr" sz="quarter" idx="11"/>
-          </p:nvPr>
-        </p:nvSpPr>
-        <p:spPr/>
-        <p:txBody>
-          <a:bodyPr/>
-          <a:lstStyle/>
-          <a:p>
-            <a:pPr defTabSz="984654" eaLnBrk="0" hangingPunct="0">
-              <a:defRPr/>
-            </a:pPr>
-            <a:r>
-              <a:rPr lang="en-US" sz="400">
-                <a:gradFill>
-                  <a:gsLst>
-                    <a:gs pos="0">
-                      <a:prstClr val="black"/>
-                    </a:gs>
-                    <a:gs pos="100000">
-                      <a:prstClr val="black"/>
-                    </a:gs>
-                  </a:gsLst>
-                  <a:lin ang="5400000" scaled="0"/>
-                </a:gradFill>
-                <a:latin typeface="Segoe UI" pitchFamily="34" charset="0"/>
-                <a:ea typeface="Segoe UI" pitchFamily="34" charset="0"/>
-                <a:cs typeface="Segoe UI" pitchFamily="34" charset="0"/>
-              </a:rPr>
-              <a:t>© 2016 Microsoft Corporation. All rights reserved. MICROSOFT MAKES NO WARRANTIES, EXPRESS, IMPLIED OR STATUTORY, AS TO THE INFORMATION IN THIS PRESENTATION.</a:t>
-            </a:r>
-          </a:p>
-        </p:txBody>
-      </p:sp>
-      <p:sp>
-        <p:nvSpPr>
-          <p:cNvPr id="6" name="Date Placeholder 5"/>
-          <p:cNvSpPr>
-            <a:spLocks noGrp="1"/>
-          </p:cNvSpPr>
-          <p:nvPr>
-            <p:ph type="dt" idx="12"/>
-          </p:nvPr>
-        </p:nvSpPr>
-        <p:spPr/>
-        <p:txBody>
-          <a:bodyPr/>
-          <a:lstStyle/>
-          <a:p>
-            <a:pPr defTabSz="1004735">
-              <a:defRPr/>
-            </a:pPr>
-            <a:fld id="{38EEC551-8CDA-4EB6-89BB-2A86C9F091C8}" type="datetime8">
-              <a:rPr lang="en-US">
-                <a:solidFill>
-                  <a:prstClr val="black"/>
-                </a:solidFill>
-                <a:latin typeface="Calibri" panose="020F0502020204030204"/>
-              </a:rPr>
-              <a:pPr defTabSz="1004735">
-                <a:defRPr/>
-              </a:pPr>
-              <a:t>3/20/2018 4:22 PM</a:t>
-            </a:fld>
-            <a:endParaRPr lang="en-US">
-              <a:solidFill>
-                <a:prstClr val="black"/>
-              </a:solidFill>
-              <a:latin typeface="Calibri" panose="020F0502020204030204"/>
-            </a:endParaRPr>
-          </a:p>
-        </p:txBody>
-      </p:sp>
-      <p:sp>
-        <p:nvSpPr>
           <p:cNvPr id="7" name="Slide Number Placeholder 6"/>
           <p:cNvSpPr>
             <a:spLocks noGrp="1"/>
@@ -7663,6 +7732,49 @@
               </a:solidFill>
               <a:latin typeface="Calibri" panose="020F0502020204030204"/>
             </a:endParaRPr>
+          </a:p>
+        </p:txBody>
+      </p:sp>
+      <p:sp>
+        <p:nvSpPr>
+          <p:cNvPr id="8" name="Header Placeholder 10">
+            <a:extLst>
+              <a:ext uri="{FF2B5EF4-FFF2-40B4-BE49-F238E27FC236}">
+                <a16:creationId xmlns:a16="http://schemas.microsoft.com/office/drawing/2014/main" id="{BA0A9682-9551-48BB-9E1E-C3AFDBD64EEA}"/>
+              </a:ext>
+            </a:extLst>
+          </p:cNvPr>
+          <p:cNvSpPr>
+            <a:spLocks noGrp="1"/>
+          </p:cNvSpPr>
+          <p:nvPr>
+            <p:ph type="hdr" sz="quarter"/>
+          </p:nvPr>
+        </p:nvSpPr>
+        <p:spPr>
+          <a:xfrm>
+            <a:off x="0" y="0"/>
+            <a:ext cx="3170238" cy="481013"/>
+          </a:xfrm>
+          <a:prstGeom prst="rect">
+            <a:avLst/>
+          </a:prstGeom>
+        </p:spPr>
+        <p:txBody>
+          <a:bodyPr vert="horz" lIns="91440" tIns="45720" rIns="91440" bIns="45720" rtlCol="0"/>
+          <a:lstStyle>
+            <a:lvl1pPr algn="l">
+              <a:defRPr sz="1200"/>
+            </a:lvl1pPr>
+          </a:lstStyle>
+          <a:p>
+            <a:r>
+              <a:rPr lang="en-US" dirty="0"/>
+              <a:t>https://github.com/dotnet-presentations/home</a:t>
+            </a:r>
+          </a:p>
+          <a:p>
+            <a:endParaRPr lang="en-US" dirty="0"/>
           </a:p>
         </p:txBody>
       </p:sp>
@@ -7753,6 +7865,49 @@
           </a:p>
         </p:txBody>
       </p:sp>
+      <p:sp>
+        <p:nvSpPr>
+          <p:cNvPr id="5" name="Header Placeholder 10">
+            <a:extLst>
+              <a:ext uri="{FF2B5EF4-FFF2-40B4-BE49-F238E27FC236}">
+                <a16:creationId xmlns:a16="http://schemas.microsoft.com/office/drawing/2014/main" id="{B97ED9AE-6E82-4D32-9F42-74C22E074F0F}"/>
+              </a:ext>
+            </a:extLst>
+          </p:cNvPr>
+          <p:cNvSpPr>
+            <a:spLocks noGrp="1"/>
+          </p:cNvSpPr>
+          <p:nvPr>
+            <p:ph type="hdr" sz="quarter"/>
+          </p:nvPr>
+        </p:nvSpPr>
+        <p:spPr>
+          <a:xfrm>
+            <a:off x="0" y="0"/>
+            <a:ext cx="3170238" cy="481013"/>
+          </a:xfrm>
+          <a:prstGeom prst="rect">
+            <a:avLst/>
+          </a:prstGeom>
+        </p:spPr>
+        <p:txBody>
+          <a:bodyPr vert="horz" lIns="91440" tIns="45720" rIns="91440" bIns="45720" rtlCol="0"/>
+          <a:lstStyle>
+            <a:lvl1pPr algn="l">
+              <a:defRPr sz="1200"/>
+            </a:lvl1pPr>
+          </a:lstStyle>
+          <a:p>
+            <a:r>
+              <a:rPr lang="en-US" dirty="0"/>
+              <a:t>https://github.com/dotnet-presentations/home</a:t>
+            </a:r>
+          </a:p>
+          <a:p>
+            <a:endParaRPr lang="en-US" dirty="0"/>
+          </a:p>
+        </p:txBody>
+      </p:sp>
     </p:spTree>
     <p:extLst>
       <p:ext uri="{BB962C8B-B14F-4D97-AF65-F5344CB8AC3E}">
@@ -7819,115 +7974,6 @@
       </p:sp>
       <p:sp>
         <p:nvSpPr>
-          <p:cNvPr id="4" name="Header Placeholder 3"/>
-          <p:cNvSpPr>
-            <a:spLocks noGrp="1"/>
-          </p:cNvSpPr>
-          <p:nvPr>
-            <p:ph type="hdr" sz="quarter" idx="10"/>
-          </p:nvPr>
-        </p:nvSpPr>
-        <p:spPr/>
-        <p:txBody>
-          <a:bodyPr/>
-          <a:lstStyle/>
-          <a:p>
-            <a:pPr defTabSz="986002">
-              <a:defRPr/>
-            </a:pPr>
-            <a:r>
-              <a:rPr lang="en-US">
-                <a:solidFill>
-                  <a:prstClr val="black"/>
-                </a:solidFill>
-                <a:latin typeface="Segoe UI" pitchFamily="34" charset="0"/>
-              </a:rPr>
-              <a:t>Microsoft Build 2017</a:t>
-            </a:r>
-          </a:p>
-        </p:txBody>
-      </p:sp>
-      <p:sp>
-        <p:nvSpPr>
-          <p:cNvPr id="5" name="Footer Placeholder 4"/>
-          <p:cNvSpPr>
-            <a:spLocks noGrp="1"/>
-          </p:cNvSpPr>
-          <p:nvPr>
-            <p:ph type="ftr" sz="quarter" idx="11"/>
-          </p:nvPr>
-        </p:nvSpPr>
-        <p:spPr/>
-        <p:txBody>
-          <a:bodyPr/>
-          <a:lstStyle/>
-          <a:p>
-            <a:pPr marL="604133" defTabSz="966294" eaLnBrk="0" hangingPunct="0">
-              <a:defRPr/>
-            </a:pPr>
-            <a:r>
-              <a:rPr lang="en-US" sz="400">
-                <a:gradFill>
-                  <a:gsLst>
-                    <a:gs pos="0">
-                      <a:prstClr val="black"/>
-                    </a:gs>
-                    <a:gs pos="100000">
-                      <a:prstClr val="black"/>
-                    </a:gs>
-                  </a:gsLst>
-                  <a:lin ang="5400000" scaled="0"/>
-                </a:gradFill>
-                <a:latin typeface="Segoe UI" pitchFamily="34" charset="0"/>
-                <a:ea typeface="Segoe UI" pitchFamily="34" charset="0"/>
-                <a:cs typeface="Segoe UI" pitchFamily="34" charset="0"/>
-              </a:rPr>
-              <a:t>© Microsoft Corporation. All rights reserved. MICROSOFT MAKES NO WARRANTIES, EXPRESS, IMPLIED OR STATUTORY, AS TO THE INFORMATION IN THIS PRESENTATION.</a:t>
-            </a:r>
-          </a:p>
-        </p:txBody>
-      </p:sp>
-      <p:sp>
-        <p:nvSpPr>
-          <p:cNvPr id="6" name="Date Placeholder 5"/>
-          <p:cNvSpPr>
-            <a:spLocks noGrp="1"/>
-          </p:cNvSpPr>
-          <p:nvPr>
-            <p:ph type="dt" idx="12"/>
-          </p:nvPr>
-        </p:nvSpPr>
-        <p:spPr/>
-        <p:txBody>
-          <a:bodyPr/>
-          <a:lstStyle/>
-          <a:p>
-            <a:pPr defTabSz="986002">
-              <a:defRPr/>
-            </a:pPr>
-            <a:fld id="{D18B56EA-E28F-4F92-9F16-7A6F2501B303}" type="datetime8">
-              <a:rPr lang="en-US">
-                <a:solidFill>
-                  <a:prstClr val="black"/>
-                </a:solidFill>
-                <a:latin typeface="Segoe UI" pitchFamily="34" charset="0"/>
-              </a:rPr>
-              <a:pPr defTabSz="986002">
-                <a:defRPr/>
-              </a:pPr>
-              <a:t>3/20/2018 4:22 PM</a:t>
-            </a:fld>
-            <a:endParaRPr lang="en-US">
-              <a:solidFill>
-                <a:prstClr val="black"/>
-              </a:solidFill>
-              <a:latin typeface="Segoe UI" pitchFamily="34" charset="0"/>
-            </a:endParaRPr>
-          </a:p>
-        </p:txBody>
-      </p:sp>
-      <p:sp>
-        <p:nvSpPr>
           <p:cNvPr id="7" name="Slide Number Placeholder 6"/>
           <p:cNvSpPr>
             <a:spLocks noGrp="1"/>
@@ -7962,6 +8008,49 @@
               </a:solidFill>
               <a:latin typeface="Segoe UI" pitchFamily="34" charset="0"/>
             </a:endParaRPr>
+          </a:p>
+        </p:txBody>
+      </p:sp>
+      <p:sp>
+        <p:nvSpPr>
+          <p:cNvPr id="8" name="Header Placeholder 10">
+            <a:extLst>
+              <a:ext uri="{FF2B5EF4-FFF2-40B4-BE49-F238E27FC236}">
+                <a16:creationId xmlns:a16="http://schemas.microsoft.com/office/drawing/2014/main" id="{71E255AA-A44E-4218-B613-F704AC76BACB}"/>
+              </a:ext>
+            </a:extLst>
+          </p:cNvPr>
+          <p:cNvSpPr>
+            <a:spLocks noGrp="1"/>
+          </p:cNvSpPr>
+          <p:nvPr>
+            <p:ph type="hdr" sz="quarter"/>
+          </p:nvPr>
+        </p:nvSpPr>
+        <p:spPr>
+          <a:xfrm>
+            <a:off x="0" y="0"/>
+            <a:ext cx="3170238" cy="481013"/>
+          </a:xfrm>
+          <a:prstGeom prst="rect">
+            <a:avLst/>
+          </a:prstGeom>
+        </p:spPr>
+        <p:txBody>
+          <a:bodyPr vert="horz" lIns="91440" tIns="45720" rIns="91440" bIns="45720" rtlCol="0"/>
+          <a:lstStyle>
+            <a:lvl1pPr algn="l">
+              <a:defRPr sz="1200"/>
+            </a:lvl1pPr>
+          </a:lstStyle>
+          <a:p>
+            <a:r>
+              <a:rPr lang="en-US" dirty="0"/>
+              <a:t>https://github.com/dotnet-presentations/home</a:t>
+            </a:r>
+          </a:p>
+          <a:p>
+            <a:endParaRPr lang="en-US" dirty="0"/>
           </a:p>
         </p:txBody>
       </p:sp>
@@ -8068,6 +8157,49 @@
           </a:p>
         </p:txBody>
       </p:sp>
+      <p:sp>
+        <p:nvSpPr>
+          <p:cNvPr id="5" name="Header Placeholder 10">
+            <a:extLst>
+              <a:ext uri="{FF2B5EF4-FFF2-40B4-BE49-F238E27FC236}">
+                <a16:creationId xmlns:a16="http://schemas.microsoft.com/office/drawing/2014/main" id="{44AAF98E-DC76-4EA1-8AF6-30E24F8648DD}"/>
+              </a:ext>
+            </a:extLst>
+          </p:cNvPr>
+          <p:cNvSpPr>
+            <a:spLocks noGrp="1"/>
+          </p:cNvSpPr>
+          <p:nvPr>
+            <p:ph type="hdr" sz="quarter"/>
+          </p:nvPr>
+        </p:nvSpPr>
+        <p:spPr>
+          <a:xfrm>
+            <a:off x="0" y="0"/>
+            <a:ext cx="3170238" cy="481013"/>
+          </a:xfrm>
+          <a:prstGeom prst="rect">
+            <a:avLst/>
+          </a:prstGeom>
+        </p:spPr>
+        <p:txBody>
+          <a:bodyPr vert="horz" lIns="91440" tIns="45720" rIns="91440" bIns="45720" rtlCol="0"/>
+          <a:lstStyle>
+            <a:lvl1pPr algn="l">
+              <a:defRPr sz="1200"/>
+            </a:lvl1pPr>
+          </a:lstStyle>
+          <a:p>
+            <a:r>
+              <a:rPr lang="en-US" dirty="0"/>
+              <a:t>https://github.com/dotnet-presentations/home</a:t>
+            </a:r>
+          </a:p>
+          <a:p>
+            <a:endParaRPr lang="en-US" dirty="0"/>
+          </a:p>
+        </p:txBody>
+      </p:sp>
     </p:spTree>
     <p:extLst>
       <p:ext uri="{BB962C8B-B14F-4D97-AF65-F5344CB8AC3E}">
@@ -8165,6 +8297,49 @@
               </a:solidFill>
               <a:latin typeface="Calibri" panose="020F0502020204030204"/>
             </a:endParaRPr>
+          </a:p>
+        </p:txBody>
+      </p:sp>
+      <p:sp>
+        <p:nvSpPr>
+          <p:cNvPr id="5" name="Header Placeholder 10">
+            <a:extLst>
+              <a:ext uri="{FF2B5EF4-FFF2-40B4-BE49-F238E27FC236}">
+                <a16:creationId xmlns:a16="http://schemas.microsoft.com/office/drawing/2014/main" id="{DE65F77B-63D7-4180-9A8C-A9F24C269718}"/>
+              </a:ext>
+            </a:extLst>
+          </p:cNvPr>
+          <p:cNvSpPr>
+            <a:spLocks noGrp="1"/>
+          </p:cNvSpPr>
+          <p:nvPr>
+            <p:ph type="hdr" sz="quarter"/>
+          </p:nvPr>
+        </p:nvSpPr>
+        <p:spPr>
+          <a:xfrm>
+            <a:off x="0" y="0"/>
+            <a:ext cx="3170238" cy="481013"/>
+          </a:xfrm>
+          <a:prstGeom prst="rect">
+            <a:avLst/>
+          </a:prstGeom>
+        </p:spPr>
+        <p:txBody>
+          <a:bodyPr vert="horz" lIns="91440" tIns="45720" rIns="91440" bIns="45720" rtlCol="0"/>
+          <a:lstStyle>
+            <a:lvl1pPr algn="l">
+              <a:defRPr sz="1200"/>
+            </a:lvl1pPr>
+          </a:lstStyle>
+          <a:p>
+            <a:r>
+              <a:rPr lang="en-US" dirty="0"/>
+              <a:t>https://github.com/dotnet-presentations/home</a:t>
+            </a:r>
+          </a:p>
+          <a:p>
+            <a:endParaRPr lang="en-US" dirty="0"/>
           </a:p>
         </p:txBody>
       </p:sp>
@@ -8271,6 +8446,49 @@
           </a:p>
         </p:txBody>
       </p:sp>
+      <p:sp>
+        <p:nvSpPr>
+          <p:cNvPr id="5" name="Header Placeholder 10">
+            <a:extLst>
+              <a:ext uri="{FF2B5EF4-FFF2-40B4-BE49-F238E27FC236}">
+                <a16:creationId xmlns:a16="http://schemas.microsoft.com/office/drawing/2014/main" id="{913E86A2-2B63-443A-9F8D-ED5CE2E88FBC}"/>
+              </a:ext>
+            </a:extLst>
+          </p:cNvPr>
+          <p:cNvSpPr>
+            <a:spLocks noGrp="1"/>
+          </p:cNvSpPr>
+          <p:nvPr>
+            <p:ph type="hdr" sz="quarter"/>
+          </p:nvPr>
+        </p:nvSpPr>
+        <p:spPr>
+          <a:xfrm>
+            <a:off x="0" y="0"/>
+            <a:ext cx="3170238" cy="481013"/>
+          </a:xfrm>
+          <a:prstGeom prst="rect">
+            <a:avLst/>
+          </a:prstGeom>
+        </p:spPr>
+        <p:txBody>
+          <a:bodyPr vert="horz" lIns="91440" tIns="45720" rIns="91440" bIns="45720" rtlCol="0"/>
+          <a:lstStyle>
+            <a:lvl1pPr algn="l">
+              <a:defRPr sz="1200"/>
+            </a:lvl1pPr>
+          </a:lstStyle>
+          <a:p>
+            <a:r>
+              <a:rPr lang="en-US" dirty="0"/>
+              <a:t>https://github.com/dotnet-presentations/home</a:t>
+            </a:r>
+          </a:p>
+          <a:p>
+            <a:endParaRPr lang="en-US" dirty="0"/>
+          </a:p>
+        </p:txBody>
+      </p:sp>
     </p:spTree>
     <p:extLst>
       <p:ext uri="{BB962C8B-B14F-4D97-AF65-F5344CB8AC3E}">
@@ -8371,6 +8589,49 @@
               </a:solidFill>
               <a:latin typeface="Calibri" panose="020F0502020204030204"/>
             </a:endParaRPr>
+          </a:p>
+        </p:txBody>
+      </p:sp>
+      <p:sp>
+        <p:nvSpPr>
+          <p:cNvPr id="5" name="Header Placeholder 10">
+            <a:extLst>
+              <a:ext uri="{FF2B5EF4-FFF2-40B4-BE49-F238E27FC236}">
+                <a16:creationId xmlns:a16="http://schemas.microsoft.com/office/drawing/2014/main" id="{FC39B0B8-F1E0-4EB2-A799-4FA4D7F28B1E}"/>
+              </a:ext>
+            </a:extLst>
+          </p:cNvPr>
+          <p:cNvSpPr>
+            <a:spLocks noGrp="1"/>
+          </p:cNvSpPr>
+          <p:nvPr>
+            <p:ph type="hdr" sz="quarter"/>
+          </p:nvPr>
+        </p:nvSpPr>
+        <p:spPr>
+          <a:xfrm>
+            <a:off x="0" y="0"/>
+            <a:ext cx="3170238" cy="481013"/>
+          </a:xfrm>
+          <a:prstGeom prst="rect">
+            <a:avLst/>
+          </a:prstGeom>
+        </p:spPr>
+        <p:txBody>
+          <a:bodyPr vert="horz" lIns="91440" tIns="45720" rIns="91440" bIns="45720" rtlCol="0"/>
+          <a:lstStyle>
+            <a:lvl1pPr algn="l">
+              <a:defRPr sz="1200"/>
+            </a:lvl1pPr>
+          </a:lstStyle>
+          <a:p>
+            <a:r>
+              <a:rPr lang="en-US" dirty="0"/>
+              <a:t>https://github.com/dotnet-presentations/home</a:t>
+            </a:r>
+          </a:p>
+          <a:p>
+            <a:endParaRPr lang="en-US" dirty="0"/>
           </a:p>
         </p:txBody>
       </p:sp>
@@ -8512,6 +8773,49 @@
           </a:p>
         </p:txBody>
       </p:sp>
+      <p:sp>
+        <p:nvSpPr>
+          <p:cNvPr id="5" name="Header Placeholder 10">
+            <a:extLst>
+              <a:ext uri="{FF2B5EF4-FFF2-40B4-BE49-F238E27FC236}">
+                <a16:creationId xmlns:a16="http://schemas.microsoft.com/office/drawing/2014/main" id="{844CBA84-9978-4A47-9720-91A757AB5E8A}"/>
+              </a:ext>
+            </a:extLst>
+          </p:cNvPr>
+          <p:cNvSpPr>
+            <a:spLocks noGrp="1"/>
+          </p:cNvSpPr>
+          <p:nvPr>
+            <p:ph type="hdr" sz="quarter"/>
+          </p:nvPr>
+        </p:nvSpPr>
+        <p:spPr>
+          <a:xfrm>
+            <a:off x="0" y="0"/>
+            <a:ext cx="3170238" cy="481013"/>
+          </a:xfrm>
+          <a:prstGeom prst="rect">
+            <a:avLst/>
+          </a:prstGeom>
+        </p:spPr>
+        <p:txBody>
+          <a:bodyPr vert="horz" lIns="91440" tIns="45720" rIns="91440" bIns="45720" rtlCol="0"/>
+          <a:lstStyle>
+            <a:lvl1pPr algn="l">
+              <a:defRPr sz="1200"/>
+            </a:lvl1pPr>
+          </a:lstStyle>
+          <a:p>
+            <a:r>
+              <a:rPr lang="en-US" dirty="0"/>
+              <a:t>https://github.com/dotnet-presentations/home</a:t>
+            </a:r>
+          </a:p>
+          <a:p>
+            <a:endParaRPr lang="en-US" dirty="0"/>
+          </a:p>
+        </p:txBody>
+      </p:sp>
     </p:spTree>
     <p:extLst>
       <p:ext uri="{BB962C8B-B14F-4D97-AF65-F5344CB8AC3E}">
@@ -8596,6 +8900,49 @@
               <a:t>18</a:t>
             </a:fld>
             <a:endParaRPr lang="en-US"/>
+          </a:p>
+        </p:txBody>
+      </p:sp>
+      <p:sp>
+        <p:nvSpPr>
+          <p:cNvPr id="5" name="Header Placeholder 10">
+            <a:extLst>
+              <a:ext uri="{FF2B5EF4-FFF2-40B4-BE49-F238E27FC236}">
+                <a16:creationId xmlns:a16="http://schemas.microsoft.com/office/drawing/2014/main" id="{43AD052D-DF69-459D-86BF-623D5EA6F6A5}"/>
+              </a:ext>
+            </a:extLst>
+          </p:cNvPr>
+          <p:cNvSpPr>
+            <a:spLocks noGrp="1"/>
+          </p:cNvSpPr>
+          <p:nvPr>
+            <p:ph type="hdr" sz="quarter"/>
+          </p:nvPr>
+        </p:nvSpPr>
+        <p:spPr>
+          <a:xfrm>
+            <a:off x="0" y="0"/>
+            <a:ext cx="3170238" cy="481013"/>
+          </a:xfrm>
+          <a:prstGeom prst="rect">
+            <a:avLst/>
+          </a:prstGeom>
+        </p:spPr>
+        <p:txBody>
+          <a:bodyPr vert="horz" lIns="91440" tIns="45720" rIns="91440" bIns="45720" rtlCol="0"/>
+          <a:lstStyle>
+            <a:lvl1pPr algn="l">
+              <a:defRPr sz="1200"/>
+            </a:lvl1pPr>
+          </a:lstStyle>
+          <a:p>
+            <a:r>
+              <a:rPr lang="en-US" dirty="0"/>
+              <a:t>https://github.com/dotnet-presentations/home</a:t>
+            </a:r>
+          </a:p>
+          <a:p>
+            <a:endParaRPr lang="en-US" dirty="0"/>
           </a:p>
         </p:txBody>
       </p:sp>
@@ -8720,6 +9067,49 @@
           </a:p>
         </p:txBody>
       </p:sp>
+      <p:sp>
+        <p:nvSpPr>
+          <p:cNvPr id="5" name="Header Placeholder 10">
+            <a:extLst>
+              <a:ext uri="{FF2B5EF4-FFF2-40B4-BE49-F238E27FC236}">
+                <a16:creationId xmlns:a16="http://schemas.microsoft.com/office/drawing/2014/main" id="{389753A2-5F8A-4548-8AA2-356A80BBADBE}"/>
+              </a:ext>
+            </a:extLst>
+          </p:cNvPr>
+          <p:cNvSpPr>
+            <a:spLocks noGrp="1"/>
+          </p:cNvSpPr>
+          <p:nvPr>
+            <p:ph type="hdr" sz="quarter"/>
+          </p:nvPr>
+        </p:nvSpPr>
+        <p:spPr>
+          <a:xfrm>
+            <a:off x="0" y="0"/>
+            <a:ext cx="3170238" cy="481013"/>
+          </a:xfrm>
+          <a:prstGeom prst="rect">
+            <a:avLst/>
+          </a:prstGeom>
+        </p:spPr>
+        <p:txBody>
+          <a:bodyPr vert="horz" lIns="91440" tIns="45720" rIns="91440" bIns="45720" rtlCol="0"/>
+          <a:lstStyle>
+            <a:lvl1pPr algn="l">
+              <a:defRPr sz="1200"/>
+            </a:lvl1pPr>
+          </a:lstStyle>
+          <a:p>
+            <a:r>
+              <a:rPr lang="en-US" dirty="0"/>
+              <a:t>https://github.com/dotnet-presentations/home</a:t>
+            </a:r>
+          </a:p>
+          <a:p>
+            <a:endParaRPr lang="en-US" dirty="0"/>
+          </a:p>
+        </p:txBody>
+      </p:sp>
     </p:spTree>
     <p:extLst>
       <p:ext uri="{BB962C8B-B14F-4D97-AF65-F5344CB8AC3E}">
@@ -8777,7 +9167,10 @@
           <a:bodyPr/>
           <a:lstStyle/>
           <a:p>
-            <a:endParaRPr lang="en-US"/>
+            <a:r>
+              <a:rPr lang="en-US" dirty="0"/>
+              <a:t>So what is .NET?</a:t>
+            </a:r>
           </a:p>
         </p:txBody>
       </p:sp>
@@ -8893,6 +9286,49 @@
               <a:t>20</a:t>
             </a:fld>
             <a:endParaRPr lang="en-US"/>
+          </a:p>
+        </p:txBody>
+      </p:sp>
+      <p:sp>
+        <p:nvSpPr>
+          <p:cNvPr id="5" name="Header Placeholder 10">
+            <a:extLst>
+              <a:ext uri="{FF2B5EF4-FFF2-40B4-BE49-F238E27FC236}">
+                <a16:creationId xmlns:a16="http://schemas.microsoft.com/office/drawing/2014/main" id="{5DA3948D-156A-44E9-AF62-E5BCD2B66E49}"/>
+              </a:ext>
+            </a:extLst>
+          </p:cNvPr>
+          <p:cNvSpPr>
+            <a:spLocks noGrp="1"/>
+          </p:cNvSpPr>
+          <p:nvPr>
+            <p:ph type="hdr" sz="quarter"/>
+          </p:nvPr>
+        </p:nvSpPr>
+        <p:spPr>
+          <a:xfrm>
+            <a:off x="0" y="0"/>
+            <a:ext cx="3170238" cy="481013"/>
+          </a:xfrm>
+          <a:prstGeom prst="rect">
+            <a:avLst/>
+          </a:prstGeom>
+        </p:spPr>
+        <p:txBody>
+          <a:bodyPr vert="horz" lIns="91440" tIns="45720" rIns="91440" bIns="45720" rtlCol="0"/>
+          <a:lstStyle>
+            <a:lvl1pPr algn="l">
+              <a:defRPr sz="1200"/>
+            </a:lvl1pPr>
+          </a:lstStyle>
+          <a:p>
+            <a:r>
+              <a:rPr lang="en-US" dirty="0"/>
+              <a:t>https://github.com/dotnet-presentations/home</a:t>
+            </a:r>
+          </a:p>
+          <a:p>
+            <a:endParaRPr lang="en-US" dirty="0"/>
           </a:p>
         </p:txBody>
       </p:sp>
@@ -9101,6 +9537,49 @@
           </a:p>
         </p:txBody>
       </p:sp>
+      <p:sp>
+        <p:nvSpPr>
+          <p:cNvPr id="5" name="Header Placeholder 10">
+            <a:extLst>
+              <a:ext uri="{FF2B5EF4-FFF2-40B4-BE49-F238E27FC236}">
+                <a16:creationId xmlns:a16="http://schemas.microsoft.com/office/drawing/2014/main" id="{0B36E475-4515-40F9-9BE0-F39BF7F82595}"/>
+              </a:ext>
+            </a:extLst>
+          </p:cNvPr>
+          <p:cNvSpPr>
+            <a:spLocks noGrp="1"/>
+          </p:cNvSpPr>
+          <p:nvPr>
+            <p:ph type="hdr" sz="quarter"/>
+          </p:nvPr>
+        </p:nvSpPr>
+        <p:spPr>
+          <a:xfrm>
+            <a:off x="0" y="0"/>
+            <a:ext cx="3170238" cy="481013"/>
+          </a:xfrm>
+          <a:prstGeom prst="rect">
+            <a:avLst/>
+          </a:prstGeom>
+        </p:spPr>
+        <p:txBody>
+          <a:bodyPr vert="horz" lIns="91440" tIns="45720" rIns="91440" bIns="45720" rtlCol="0"/>
+          <a:lstStyle>
+            <a:lvl1pPr algn="l">
+              <a:defRPr sz="1200"/>
+            </a:lvl1pPr>
+          </a:lstStyle>
+          <a:p>
+            <a:r>
+              <a:rPr lang="en-US" dirty="0"/>
+              <a:t>https://github.com/dotnet-presentations/home</a:t>
+            </a:r>
+          </a:p>
+          <a:p>
+            <a:endParaRPr lang="en-US" dirty="0"/>
+          </a:p>
+        </p:txBody>
+      </p:sp>
     </p:spTree>
     <p:extLst>
       <p:ext uri="{BB962C8B-B14F-4D97-AF65-F5344CB8AC3E}">
@@ -9198,6 +9677,49 @@
               </a:solidFill>
               <a:latin typeface="Calibri" panose="020F0502020204030204"/>
             </a:endParaRPr>
+          </a:p>
+        </p:txBody>
+      </p:sp>
+      <p:sp>
+        <p:nvSpPr>
+          <p:cNvPr id="5" name="Header Placeholder 10">
+            <a:extLst>
+              <a:ext uri="{FF2B5EF4-FFF2-40B4-BE49-F238E27FC236}">
+                <a16:creationId xmlns:a16="http://schemas.microsoft.com/office/drawing/2014/main" id="{055E7980-2E48-42BA-84EE-13737B7BCA61}"/>
+              </a:ext>
+            </a:extLst>
+          </p:cNvPr>
+          <p:cNvSpPr>
+            <a:spLocks noGrp="1"/>
+          </p:cNvSpPr>
+          <p:nvPr>
+            <p:ph type="hdr" sz="quarter"/>
+          </p:nvPr>
+        </p:nvSpPr>
+        <p:spPr>
+          <a:xfrm>
+            <a:off x="0" y="0"/>
+            <a:ext cx="3170238" cy="481013"/>
+          </a:xfrm>
+          <a:prstGeom prst="rect">
+            <a:avLst/>
+          </a:prstGeom>
+        </p:spPr>
+        <p:txBody>
+          <a:bodyPr vert="horz" lIns="91440" tIns="45720" rIns="91440" bIns="45720" rtlCol="0"/>
+          <a:lstStyle>
+            <a:lvl1pPr algn="l">
+              <a:defRPr sz="1200"/>
+            </a:lvl1pPr>
+          </a:lstStyle>
+          <a:p>
+            <a:r>
+              <a:rPr lang="en-US" dirty="0"/>
+              <a:t>https://github.com/dotnet-presentations/home</a:t>
+            </a:r>
+          </a:p>
+          <a:p>
+            <a:endParaRPr lang="en-US" dirty="0"/>
           </a:p>
         </p:txBody>
       </p:sp>
@@ -9349,6 +9871,49 @@
           </a:p>
         </p:txBody>
       </p:sp>
+      <p:sp>
+        <p:nvSpPr>
+          <p:cNvPr id="5" name="Header Placeholder 10">
+            <a:extLst>
+              <a:ext uri="{FF2B5EF4-FFF2-40B4-BE49-F238E27FC236}">
+                <a16:creationId xmlns:a16="http://schemas.microsoft.com/office/drawing/2014/main" id="{AB5F594E-8458-4AE9-887A-9FBCC1B47156}"/>
+              </a:ext>
+            </a:extLst>
+          </p:cNvPr>
+          <p:cNvSpPr>
+            <a:spLocks noGrp="1"/>
+          </p:cNvSpPr>
+          <p:nvPr>
+            <p:ph type="hdr" sz="quarter"/>
+          </p:nvPr>
+        </p:nvSpPr>
+        <p:spPr>
+          <a:xfrm>
+            <a:off x="0" y="0"/>
+            <a:ext cx="3170238" cy="481013"/>
+          </a:xfrm>
+          <a:prstGeom prst="rect">
+            <a:avLst/>
+          </a:prstGeom>
+        </p:spPr>
+        <p:txBody>
+          <a:bodyPr vert="horz" lIns="91440" tIns="45720" rIns="91440" bIns="45720" rtlCol="0"/>
+          <a:lstStyle>
+            <a:lvl1pPr algn="l">
+              <a:defRPr sz="1200"/>
+            </a:lvl1pPr>
+          </a:lstStyle>
+          <a:p>
+            <a:r>
+              <a:rPr lang="en-US" dirty="0"/>
+              <a:t>https://github.com/dotnet-presentations/home</a:t>
+            </a:r>
+          </a:p>
+          <a:p>
+            <a:endParaRPr lang="en-US" dirty="0"/>
+          </a:p>
+        </p:txBody>
+      </p:sp>
     </p:spTree>
     <p:extLst>
       <p:ext uri="{BB962C8B-B14F-4D97-AF65-F5344CB8AC3E}">
@@ -9455,6 +10020,49 @@
           </a:p>
         </p:txBody>
       </p:sp>
+      <p:sp>
+        <p:nvSpPr>
+          <p:cNvPr id="5" name="Header Placeholder 10">
+            <a:extLst>
+              <a:ext uri="{FF2B5EF4-FFF2-40B4-BE49-F238E27FC236}">
+                <a16:creationId xmlns:a16="http://schemas.microsoft.com/office/drawing/2014/main" id="{A3570C16-3FD0-4809-9C21-C1C051908DAD}"/>
+              </a:ext>
+            </a:extLst>
+          </p:cNvPr>
+          <p:cNvSpPr>
+            <a:spLocks noGrp="1"/>
+          </p:cNvSpPr>
+          <p:nvPr>
+            <p:ph type="hdr" sz="quarter"/>
+          </p:nvPr>
+        </p:nvSpPr>
+        <p:spPr>
+          <a:xfrm>
+            <a:off x="0" y="0"/>
+            <a:ext cx="3170238" cy="481013"/>
+          </a:xfrm>
+          <a:prstGeom prst="rect">
+            <a:avLst/>
+          </a:prstGeom>
+        </p:spPr>
+        <p:txBody>
+          <a:bodyPr vert="horz" lIns="91440" tIns="45720" rIns="91440" bIns="45720" rtlCol="0"/>
+          <a:lstStyle>
+            <a:lvl1pPr algn="l">
+              <a:defRPr sz="1200"/>
+            </a:lvl1pPr>
+          </a:lstStyle>
+          <a:p>
+            <a:r>
+              <a:rPr lang="en-US" dirty="0"/>
+              <a:t>https://github.com/dotnet-presentations/home</a:t>
+            </a:r>
+          </a:p>
+          <a:p>
+            <a:endParaRPr lang="en-US" dirty="0"/>
+          </a:p>
+        </p:txBody>
+      </p:sp>
     </p:spTree>
     <p:extLst>
       <p:ext uri="{BB962C8B-B14F-4D97-AF65-F5344CB8AC3E}">
@@ -9558,6 +10166,49 @@
           </a:p>
         </p:txBody>
       </p:sp>
+      <p:sp>
+        <p:nvSpPr>
+          <p:cNvPr id="5" name="Header Placeholder 10">
+            <a:extLst>
+              <a:ext uri="{FF2B5EF4-FFF2-40B4-BE49-F238E27FC236}">
+                <a16:creationId xmlns:a16="http://schemas.microsoft.com/office/drawing/2014/main" id="{CC8F8E5F-1494-4846-8610-13C0DEFD496D}"/>
+              </a:ext>
+            </a:extLst>
+          </p:cNvPr>
+          <p:cNvSpPr>
+            <a:spLocks noGrp="1"/>
+          </p:cNvSpPr>
+          <p:nvPr>
+            <p:ph type="hdr" sz="quarter"/>
+          </p:nvPr>
+        </p:nvSpPr>
+        <p:spPr>
+          <a:xfrm>
+            <a:off x="0" y="0"/>
+            <a:ext cx="3170238" cy="481013"/>
+          </a:xfrm>
+          <a:prstGeom prst="rect">
+            <a:avLst/>
+          </a:prstGeom>
+        </p:spPr>
+        <p:txBody>
+          <a:bodyPr vert="horz" lIns="91440" tIns="45720" rIns="91440" bIns="45720" rtlCol="0"/>
+          <a:lstStyle>
+            <a:lvl1pPr algn="l">
+              <a:defRPr sz="1200"/>
+            </a:lvl1pPr>
+          </a:lstStyle>
+          <a:p>
+            <a:r>
+              <a:rPr lang="en-US" dirty="0"/>
+              <a:t>https://github.com/dotnet-presentations/home</a:t>
+            </a:r>
+          </a:p>
+          <a:p>
+            <a:endParaRPr lang="en-US" dirty="0"/>
+          </a:p>
+        </p:txBody>
+      </p:sp>
     </p:spTree>
     <p:extLst>
       <p:ext uri="{BB962C8B-B14F-4D97-AF65-F5344CB8AC3E}">
@@ -9639,112 +10290,6 @@
       </p:sp>
       <p:sp>
         <p:nvSpPr>
-          <p:cNvPr id="4" name="Header Placeholder 3"/>
-          <p:cNvSpPr>
-            <a:spLocks noGrp="1"/>
-          </p:cNvSpPr>
-          <p:nvPr>
-            <p:ph type="hdr" sz="quarter" idx="10"/>
-          </p:nvPr>
-        </p:nvSpPr>
-        <p:spPr/>
-        <p:txBody>
-          <a:bodyPr/>
-          <a:lstStyle/>
-          <a:p>
-            <a:pPr defTabSz="986002">
-              <a:defRPr/>
-            </a:pPr>
-            <a:endParaRPr lang="en-US">
-              <a:solidFill>
-                <a:prstClr val="black"/>
-              </a:solidFill>
-              <a:latin typeface="Segoe UI" pitchFamily="34" charset="0"/>
-            </a:endParaRPr>
-          </a:p>
-        </p:txBody>
-      </p:sp>
-      <p:sp>
-        <p:nvSpPr>
-          <p:cNvPr id="5" name="Footer Placeholder 4"/>
-          <p:cNvSpPr>
-            <a:spLocks noGrp="1"/>
-          </p:cNvSpPr>
-          <p:nvPr>
-            <p:ph type="ftr" sz="quarter" idx="11"/>
-          </p:nvPr>
-        </p:nvSpPr>
-        <p:spPr/>
-        <p:txBody>
-          <a:bodyPr/>
-          <a:lstStyle/>
-          <a:p>
-            <a:pPr marL="604133" defTabSz="966294" eaLnBrk="0" hangingPunct="0">
-              <a:defRPr/>
-            </a:pPr>
-            <a:r>
-              <a:rPr lang="en-US" sz="400">
-                <a:gradFill>
-                  <a:gsLst>
-                    <a:gs pos="0">
-                      <a:prstClr val="black"/>
-                    </a:gs>
-                    <a:gs pos="100000">
-                      <a:prstClr val="black"/>
-                    </a:gs>
-                  </a:gsLst>
-                  <a:lin ang="5400000" scaled="0"/>
-                </a:gradFill>
-                <a:latin typeface="Segoe UI" pitchFamily="34" charset="0"/>
-                <a:ea typeface="Segoe UI" pitchFamily="34" charset="0"/>
-                <a:cs typeface="Segoe UI" pitchFamily="34" charset="0"/>
-              </a:rPr>
-              <a:t>© Microsoft Corporation. All rights reserved. MICROSOFT MAKES NO WARRANTIES, EXPRESS, IMPLIED OR STATUTORY, AS TO THE INFORMATION IN THIS PRESENTATION.</a:t>
-            </a:r>
-          </a:p>
-        </p:txBody>
-      </p:sp>
-      <p:sp>
-        <p:nvSpPr>
-          <p:cNvPr id="6" name="Date Placeholder 5"/>
-          <p:cNvSpPr>
-            <a:spLocks noGrp="1"/>
-          </p:cNvSpPr>
-          <p:nvPr>
-            <p:ph type="dt" idx="12"/>
-          </p:nvPr>
-        </p:nvSpPr>
-        <p:spPr/>
-        <p:txBody>
-          <a:bodyPr/>
-          <a:lstStyle/>
-          <a:p>
-            <a:pPr defTabSz="986002">
-              <a:defRPr/>
-            </a:pPr>
-            <a:fld id="{D18B56EA-E28F-4F92-9F16-7A6F2501B303}" type="datetime8">
-              <a:rPr lang="en-US">
-                <a:solidFill>
-                  <a:prstClr val="black"/>
-                </a:solidFill>
-                <a:latin typeface="Segoe UI" pitchFamily="34" charset="0"/>
-              </a:rPr>
-              <a:pPr defTabSz="986002">
-                <a:defRPr/>
-              </a:pPr>
-              <a:t>3/20/2018 4:22 PM</a:t>
-            </a:fld>
-            <a:endParaRPr lang="en-US">
-              <a:solidFill>
-                <a:prstClr val="black"/>
-              </a:solidFill>
-              <a:latin typeface="Segoe UI" pitchFamily="34" charset="0"/>
-            </a:endParaRPr>
-          </a:p>
-        </p:txBody>
-      </p:sp>
-      <p:sp>
-        <p:nvSpPr>
           <p:cNvPr id="7" name="Slide Number Placeholder 6"/>
           <p:cNvSpPr>
             <a:spLocks noGrp="1"/>
@@ -9779,6 +10324,49 @@
               </a:solidFill>
               <a:latin typeface="Segoe UI" pitchFamily="34" charset="0"/>
             </a:endParaRPr>
+          </a:p>
+        </p:txBody>
+      </p:sp>
+      <p:sp>
+        <p:nvSpPr>
+          <p:cNvPr id="8" name="Header Placeholder 10">
+            <a:extLst>
+              <a:ext uri="{FF2B5EF4-FFF2-40B4-BE49-F238E27FC236}">
+                <a16:creationId xmlns:a16="http://schemas.microsoft.com/office/drawing/2014/main" id="{81DCCBF7-E7E2-42AD-8F8C-739556351B5D}"/>
+              </a:ext>
+            </a:extLst>
+          </p:cNvPr>
+          <p:cNvSpPr>
+            <a:spLocks noGrp="1"/>
+          </p:cNvSpPr>
+          <p:nvPr>
+            <p:ph type="hdr" sz="quarter"/>
+          </p:nvPr>
+        </p:nvSpPr>
+        <p:spPr>
+          <a:xfrm>
+            <a:off x="0" y="0"/>
+            <a:ext cx="3170238" cy="481013"/>
+          </a:xfrm>
+          <a:prstGeom prst="rect">
+            <a:avLst/>
+          </a:prstGeom>
+        </p:spPr>
+        <p:txBody>
+          <a:bodyPr vert="horz" lIns="91440" tIns="45720" rIns="91440" bIns="45720" rtlCol="0"/>
+          <a:lstStyle>
+            <a:lvl1pPr algn="l">
+              <a:defRPr sz="1200"/>
+            </a:lvl1pPr>
+          </a:lstStyle>
+          <a:p>
+            <a:r>
+              <a:rPr lang="en-US" dirty="0"/>
+              <a:t>https://github.com/dotnet-presentations/home</a:t>
+            </a:r>
+          </a:p>
+          <a:p>
+            <a:endParaRPr lang="en-US" dirty="0"/>
           </a:p>
         </p:txBody>
       </p:sp>
@@ -9888,112 +10476,6 @@
       </p:sp>
       <p:sp>
         <p:nvSpPr>
-          <p:cNvPr id="4" name="Header Placeholder 3"/>
-          <p:cNvSpPr>
-            <a:spLocks noGrp="1"/>
-          </p:cNvSpPr>
-          <p:nvPr>
-            <p:ph type="hdr" sz="quarter" idx="10"/>
-          </p:nvPr>
-        </p:nvSpPr>
-        <p:spPr/>
-        <p:txBody>
-          <a:bodyPr/>
-          <a:lstStyle/>
-          <a:p>
-            <a:pPr defTabSz="986002">
-              <a:defRPr/>
-            </a:pPr>
-            <a:endParaRPr lang="en-US">
-              <a:solidFill>
-                <a:prstClr val="black"/>
-              </a:solidFill>
-              <a:latin typeface="Segoe UI" pitchFamily="34" charset="0"/>
-            </a:endParaRPr>
-          </a:p>
-        </p:txBody>
-      </p:sp>
-      <p:sp>
-        <p:nvSpPr>
-          <p:cNvPr id="5" name="Footer Placeholder 4"/>
-          <p:cNvSpPr>
-            <a:spLocks noGrp="1"/>
-          </p:cNvSpPr>
-          <p:nvPr>
-            <p:ph type="ftr" sz="quarter" idx="11"/>
-          </p:nvPr>
-        </p:nvSpPr>
-        <p:spPr/>
-        <p:txBody>
-          <a:bodyPr/>
-          <a:lstStyle/>
-          <a:p>
-            <a:pPr marL="604133" defTabSz="966294" eaLnBrk="0" hangingPunct="0">
-              <a:defRPr/>
-            </a:pPr>
-            <a:r>
-              <a:rPr lang="en-US" sz="400">
-                <a:gradFill>
-                  <a:gsLst>
-                    <a:gs pos="0">
-                      <a:prstClr val="black"/>
-                    </a:gs>
-                    <a:gs pos="100000">
-                      <a:prstClr val="black"/>
-                    </a:gs>
-                  </a:gsLst>
-                  <a:lin ang="5400000" scaled="0"/>
-                </a:gradFill>
-                <a:latin typeface="Segoe UI" pitchFamily="34" charset="0"/>
-                <a:ea typeface="Segoe UI" pitchFamily="34" charset="0"/>
-                <a:cs typeface="Segoe UI" pitchFamily="34" charset="0"/>
-              </a:rPr>
-              <a:t>© Microsoft Corporation. All rights reserved. MICROSOFT MAKES NO WARRANTIES, EXPRESS, IMPLIED OR STATUTORY, AS TO THE INFORMATION IN THIS PRESENTATION.</a:t>
-            </a:r>
-          </a:p>
-        </p:txBody>
-      </p:sp>
-      <p:sp>
-        <p:nvSpPr>
-          <p:cNvPr id="6" name="Date Placeholder 5"/>
-          <p:cNvSpPr>
-            <a:spLocks noGrp="1"/>
-          </p:cNvSpPr>
-          <p:nvPr>
-            <p:ph type="dt" idx="12"/>
-          </p:nvPr>
-        </p:nvSpPr>
-        <p:spPr/>
-        <p:txBody>
-          <a:bodyPr/>
-          <a:lstStyle/>
-          <a:p>
-            <a:pPr defTabSz="986002">
-              <a:defRPr/>
-            </a:pPr>
-            <a:fld id="{D18B56EA-E28F-4F92-9F16-7A6F2501B303}" type="datetime8">
-              <a:rPr lang="en-US">
-                <a:solidFill>
-                  <a:prstClr val="black"/>
-                </a:solidFill>
-                <a:latin typeface="Segoe UI" pitchFamily="34" charset="0"/>
-              </a:rPr>
-              <a:pPr defTabSz="986002">
-                <a:defRPr/>
-              </a:pPr>
-              <a:t>3/20/2018 4:22 PM</a:t>
-            </a:fld>
-            <a:endParaRPr lang="en-US">
-              <a:solidFill>
-                <a:prstClr val="black"/>
-              </a:solidFill>
-              <a:latin typeface="Segoe UI" pitchFamily="34" charset="0"/>
-            </a:endParaRPr>
-          </a:p>
-        </p:txBody>
-      </p:sp>
-      <p:sp>
-        <p:nvSpPr>
           <p:cNvPr id="7" name="Slide Number Placeholder 6"/>
           <p:cNvSpPr>
             <a:spLocks noGrp="1"/>
@@ -10028,6 +10510,49 @@
               </a:solidFill>
               <a:latin typeface="Segoe UI" pitchFamily="34" charset="0"/>
             </a:endParaRPr>
+          </a:p>
+        </p:txBody>
+      </p:sp>
+      <p:sp>
+        <p:nvSpPr>
+          <p:cNvPr id="8" name="Header Placeholder 10">
+            <a:extLst>
+              <a:ext uri="{FF2B5EF4-FFF2-40B4-BE49-F238E27FC236}">
+                <a16:creationId xmlns:a16="http://schemas.microsoft.com/office/drawing/2014/main" id="{90CD7AC4-82E9-4367-8CA7-1036982E541A}"/>
+              </a:ext>
+            </a:extLst>
+          </p:cNvPr>
+          <p:cNvSpPr>
+            <a:spLocks noGrp="1"/>
+          </p:cNvSpPr>
+          <p:nvPr>
+            <p:ph type="hdr" sz="quarter"/>
+          </p:nvPr>
+        </p:nvSpPr>
+        <p:spPr>
+          <a:xfrm>
+            <a:off x="0" y="0"/>
+            <a:ext cx="3170238" cy="481013"/>
+          </a:xfrm>
+          <a:prstGeom prst="rect">
+            <a:avLst/>
+          </a:prstGeom>
+        </p:spPr>
+        <p:txBody>
+          <a:bodyPr vert="horz" lIns="91440" tIns="45720" rIns="91440" bIns="45720" rtlCol="0"/>
+          <a:lstStyle>
+            <a:lvl1pPr algn="l">
+              <a:defRPr sz="1200"/>
+            </a:lvl1pPr>
+          </a:lstStyle>
+          <a:p>
+            <a:r>
+              <a:rPr lang="en-US" dirty="0"/>
+              <a:t>https://github.com/dotnet-presentations/home</a:t>
+            </a:r>
+          </a:p>
+          <a:p>
+            <a:endParaRPr lang="en-US" dirty="0"/>
           </a:p>
         </p:txBody>
       </p:sp>
@@ -10194,6 +10719,49 @@
           </a:p>
         </p:txBody>
       </p:sp>
+      <p:sp>
+        <p:nvSpPr>
+          <p:cNvPr id="5" name="Header Placeholder 10">
+            <a:extLst>
+              <a:ext uri="{FF2B5EF4-FFF2-40B4-BE49-F238E27FC236}">
+                <a16:creationId xmlns:a16="http://schemas.microsoft.com/office/drawing/2014/main" id="{5D26D21F-3566-4A31-9CF4-64F7531D051C}"/>
+              </a:ext>
+            </a:extLst>
+          </p:cNvPr>
+          <p:cNvSpPr>
+            <a:spLocks noGrp="1"/>
+          </p:cNvSpPr>
+          <p:nvPr>
+            <p:ph type="hdr" sz="quarter"/>
+          </p:nvPr>
+        </p:nvSpPr>
+        <p:spPr>
+          <a:xfrm>
+            <a:off x="0" y="0"/>
+            <a:ext cx="3170238" cy="481013"/>
+          </a:xfrm>
+          <a:prstGeom prst="rect">
+            <a:avLst/>
+          </a:prstGeom>
+        </p:spPr>
+        <p:txBody>
+          <a:bodyPr vert="horz" lIns="91440" tIns="45720" rIns="91440" bIns="45720" rtlCol="0"/>
+          <a:lstStyle>
+            <a:lvl1pPr algn="l">
+              <a:defRPr sz="1200"/>
+            </a:lvl1pPr>
+          </a:lstStyle>
+          <a:p>
+            <a:r>
+              <a:rPr lang="en-US" dirty="0"/>
+              <a:t>https://github.com/dotnet-presentations/home</a:t>
+            </a:r>
+          </a:p>
+          <a:p>
+            <a:endParaRPr lang="en-US" dirty="0"/>
+          </a:p>
+        </p:txBody>
+      </p:sp>
     </p:spTree>
     <p:extLst>
       <p:ext uri="{BB962C8B-B14F-4D97-AF65-F5344CB8AC3E}">
@@ -10226,18 +10794,6 @@
       </p:grpSpPr>
       <p:sp>
         <p:nvSpPr>
-          <p:cNvPr id="2" name="Slide Image Placeholder 1"/>
-          <p:cNvSpPr>
-            <a:spLocks noGrp="1" noRot="1" noChangeAspect="1"/>
-          </p:cNvSpPr>
-          <p:nvPr>
-            <p:ph type="sldImg"/>
-          </p:nvPr>
-        </p:nvSpPr>
-        <p:spPr/>
-      </p:sp>
-      <p:sp>
-        <p:nvSpPr>
           <p:cNvPr id="3" name="Notes Placeholder 2"/>
           <p:cNvSpPr>
             <a:spLocks noGrp="1"/>
@@ -10246,7 +10802,12 @@
             <p:ph type="body" idx="1"/>
           </p:nvPr>
         </p:nvSpPr>
-        <p:spPr/>
+        <p:spPr>
+          <a:xfrm>
+            <a:off x="493295" y="4800600"/>
+            <a:ext cx="6352673" cy="2420938"/>
+          </a:xfrm>
+        </p:spPr>
         <p:txBody>
           <a:bodyPr/>
           <a:lstStyle/>
@@ -10295,7 +10856,7 @@
             <a:pPr defTabSz="966612">
               <a:defRPr/>
             </a:pPr>
-            <a:endParaRPr lang="en-US" b="0" baseline="0" dirty="0"/>
+            <a:endParaRPr lang="en-US" b="1" dirty="0"/>
           </a:p>
           <a:p>
             <a:pPr defTabSz="966612">
@@ -10401,7 +10962,7 @@
               <a:rPr lang="en-US" baseline="0" dirty="0"/>
               <a:t> Platform “Roslyn” as open source on stage. Later in November, .NET Core project begins in the open. The technology world is shocked, and the .NET community is excited. .NET Core is a new cloud-native implementation of .NET that is geared for cross-platform, hyper-scale services as well as small IoT devices. It’s meant to bring .NET into the next 15 years of computing. And the community has been extremely supportive.</a:t>
             </a:r>
-            <a:endParaRPr lang="en-US" dirty="0"/>
+            <a:endParaRPr lang="en-US" b="0" baseline="0" dirty="0"/>
           </a:p>
           <a:p>
             <a:pPr defTabSz="966612">
@@ -10434,7 +10995,7 @@
               <a:rPr lang="en-US" baseline="0" dirty="0"/>
               <a:t> early 2016, Microsoft finally acquires Xamarin and brings Miguel de Icaza into Developer Division. Mono joins the .NET foundation and is officially supported and contributed to by Microsoft. The Microsoft community officially meets the Mono community. </a:t>
             </a:r>
-            <a:endParaRPr lang="en-US" dirty="0"/>
+            <a:endParaRPr lang="en-US" b="0" baseline="0" dirty="0"/>
           </a:p>
           <a:p>
             <a:pPr defTabSz="966612">
@@ -10487,115 +11048,6 @@
       </p:sp>
       <p:sp>
         <p:nvSpPr>
-          <p:cNvPr id="4" name="Header Placeholder 3"/>
-          <p:cNvSpPr>
-            <a:spLocks noGrp="1"/>
-          </p:cNvSpPr>
-          <p:nvPr>
-            <p:ph type="hdr" sz="quarter" idx="10"/>
-          </p:nvPr>
-        </p:nvSpPr>
-        <p:spPr/>
-        <p:txBody>
-          <a:bodyPr/>
-          <a:lstStyle/>
-          <a:p>
-            <a:pPr defTabSz="966612">
-              <a:defRPr/>
-            </a:pPr>
-            <a:r>
-              <a:rPr lang="en-US">
-                <a:solidFill>
-                  <a:prstClr val="black"/>
-                </a:solidFill>
-                <a:latin typeface="Calibri" panose="020F0502020204030204"/>
-              </a:rPr>
-              <a:t>Microsoft Ignite 2016</a:t>
-            </a:r>
-          </a:p>
-        </p:txBody>
-      </p:sp>
-      <p:sp>
-        <p:nvSpPr>
-          <p:cNvPr id="5" name="Footer Placeholder 4"/>
-          <p:cNvSpPr>
-            <a:spLocks noGrp="1"/>
-          </p:cNvSpPr>
-          <p:nvPr>
-            <p:ph type="ftr" sz="quarter" idx="11"/>
-          </p:nvPr>
-        </p:nvSpPr>
-        <p:spPr/>
-        <p:txBody>
-          <a:bodyPr/>
-          <a:lstStyle/>
-          <a:p>
-            <a:pPr defTabSz="966294" eaLnBrk="0" hangingPunct="0">
-              <a:defRPr/>
-            </a:pPr>
-            <a:r>
-              <a:rPr lang="en-US" sz="400">
-                <a:gradFill>
-                  <a:gsLst>
-                    <a:gs pos="0">
-                      <a:prstClr val="black"/>
-                    </a:gs>
-                    <a:gs pos="100000">
-                      <a:prstClr val="black"/>
-                    </a:gs>
-                  </a:gsLst>
-                  <a:lin ang="5400000" scaled="0"/>
-                </a:gradFill>
-                <a:latin typeface="Segoe UI" pitchFamily="34" charset="0"/>
-                <a:ea typeface="Segoe UI" pitchFamily="34" charset="0"/>
-                <a:cs typeface="Segoe UI" pitchFamily="34" charset="0"/>
-              </a:rPr>
-              <a:t>© 2016 Microsoft Corporation. All rights reserved. MICROSOFT MAKES NO WARRANTIES, EXPRESS, IMPLIED OR STATUTORY, AS TO THE INFORMATION IN THIS PRESENTATION.</a:t>
-            </a:r>
-          </a:p>
-        </p:txBody>
-      </p:sp>
-      <p:sp>
-        <p:nvSpPr>
-          <p:cNvPr id="6" name="Date Placeholder 5"/>
-          <p:cNvSpPr>
-            <a:spLocks noGrp="1"/>
-          </p:cNvSpPr>
-          <p:nvPr>
-            <p:ph type="dt" idx="12"/>
-          </p:nvPr>
-        </p:nvSpPr>
-        <p:spPr/>
-        <p:txBody>
-          <a:bodyPr/>
-          <a:lstStyle/>
-          <a:p>
-            <a:pPr defTabSz="966612">
-              <a:defRPr/>
-            </a:pPr>
-            <a:fld id="{38EEC551-8CDA-4EB6-89BB-2A86C9F091C8}" type="datetime8">
-              <a:rPr lang="en-US">
-                <a:solidFill>
-                  <a:prstClr val="black"/>
-                </a:solidFill>
-                <a:latin typeface="Calibri" panose="020F0502020204030204"/>
-              </a:rPr>
-              <a:pPr defTabSz="966612">
-                <a:defRPr/>
-              </a:pPr>
-              <a:t>3/20/2018 4:22 PM</a:t>
-            </a:fld>
-            <a:endParaRPr lang="en-US">
-              <a:solidFill>
-                <a:prstClr val="black"/>
-              </a:solidFill>
-              <a:latin typeface="Calibri" panose="020F0502020204030204"/>
-            </a:endParaRPr>
-          </a:p>
-        </p:txBody>
-      </p:sp>
-      <p:sp>
-        <p:nvSpPr>
           <p:cNvPr id="7" name="Slide Number Placeholder 6"/>
           <p:cNvSpPr>
             <a:spLocks noGrp="1"/>
@@ -10604,7 +11056,12 @@
             <p:ph type="sldNum" sz="quarter" idx="13"/>
           </p:nvPr>
         </p:nvSpPr>
-        <p:spPr/>
+        <p:spPr>
+          <a:xfrm>
+            <a:off x="4144963" y="9120188"/>
+            <a:ext cx="3170237" cy="481012"/>
+          </a:xfrm>
+        </p:spPr>
         <p:txBody>
           <a:bodyPr/>
           <a:lstStyle/>
@@ -10624,12 +11081,73 @@
               </a:pPr>
               <a:t>9</a:t>
             </a:fld>
-            <a:endParaRPr lang="en-US">
+            <a:endParaRPr lang="en-US" dirty="0">
               <a:solidFill>
                 <a:prstClr val="black"/>
               </a:solidFill>
               <a:latin typeface="Calibri" panose="020F0502020204030204"/>
             </a:endParaRPr>
+          </a:p>
+        </p:txBody>
+      </p:sp>
+      <p:sp>
+        <p:nvSpPr>
+          <p:cNvPr id="8" name="Slide Image Placeholder 7">
+            <a:extLst>
+              <a:ext uri="{FF2B5EF4-FFF2-40B4-BE49-F238E27FC236}">
+                <a16:creationId xmlns:a16="http://schemas.microsoft.com/office/drawing/2014/main" id="{BCAF6593-53E3-40FD-8C5A-D856B8FADFB4}"/>
+              </a:ext>
+            </a:extLst>
+          </p:cNvPr>
+          <p:cNvSpPr>
+            <a:spLocks noGrp="1" noRot="1" noChangeAspect="1"/>
+          </p:cNvSpPr>
+          <p:nvPr>
+            <p:ph type="sldImg"/>
+          </p:nvPr>
+        </p:nvSpPr>
+        <p:spPr/>
+      </p:sp>
+      <p:sp>
+        <p:nvSpPr>
+          <p:cNvPr id="10" name="Header Placeholder 10">
+            <a:extLst>
+              <a:ext uri="{FF2B5EF4-FFF2-40B4-BE49-F238E27FC236}">
+                <a16:creationId xmlns:a16="http://schemas.microsoft.com/office/drawing/2014/main" id="{A3E9A547-A109-437E-9821-7A92FBEE648A}"/>
+              </a:ext>
+            </a:extLst>
+          </p:cNvPr>
+          <p:cNvSpPr>
+            <a:spLocks noGrp="1"/>
+          </p:cNvSpPr>
+          <p:nvPr>
+            <p:ph type="hdr" sz="quarter"/>
+          </p:nvPr>
+        </p:nvSpPr>
+        <p:spPr>
+          <a:xfrm>
+            <a:off x="0" y="0"/>
+            <a:ext cx="3170238" cy="481013"/>
+          </a:xfrm>
+          <a:prstGeom prst="rect">
+            <a:avLst/>
+          </a:prstGeom>
+        </p:spPr>
+        <p:txBody>
+          <a:bodyPr vert="horz" lIns="91440" tIns="45720" rIns="91440" bIns="45720" rtlCol="0"/>
+          <a:lstStyle>
+            <a:lvl1pPr algn="l">
+              <a:defRPr sz="1200"/>
+            </a:lvl1pPr>
+          </a:lstStyle>
+          <a:p>
+            <a:r>
+              <a:rPr lang="en-US" dirty="0"/>
+              <a:t>https://github.com/dotnet-presentations/home</a:t>
+            </a:r>
+          </a:p>
+          <a:p>
+            <a:endParaRPr lang="en-US" dirty="0"/>
           </a:p>
         </p:txBody>
       </p:sp>
@@ -11488,6 +12006,160 @@
 </file>
 
 <file path=ppt/slideLayouts/slideLayout4.xml><?xml version="1.0" encoding="utf-8"?>
+<p:sldLayout xmlns:a="http://schemas.openxmlformats.org/drawingml/2006/main" xmlns:r="http://schemas.openxmlformats.org/officeDocument/2006/relationships" xmlns:p="http://schemas.openxmlformats.org/presentationml/2006/main" userDrawn="1">
+  <p:cSld name="Title &amp; Non-bulleted text">
+    <p:spTree>
+      <p:nvGrpSpPr>
+        <p:cNvPr id="1" name=""/>
+        <p:cNvGrpSpPr/>
+        <p:nvPr/>
+      </p:nvGrpSpPr>
+      <p:grpSpPr>
+        <a:xfrm>
+          <a:off x="0" y="0"/>
+          <a:ext cx="0" cy="0"/>
+          <a:chOff x="0" y="0"/>
+          <a:chExt cx="0" cy="0"/>
+        </a:xfrm>
+      </p:grpSpPr>
+      <p:sp>
+        <p:nvSpPr>
+          <p:cNvPr id="2" name="Title 1"/>
+          <p:cNvSpPr>
+            <a:spLocks noGrp="1"/>
+          </p:cNvSpPr>
+          <p:nvPr>
+            <p:ph type="title"/>
+          </p:nvPr>
+        </p:nvSpPr>
+        <p:spPr>
+          <a:xfrm>
+            <a:off x="269240" y="289511"/>
+            <a:ext cx="11510956" cy="899665"/>
+          </a:xfrm>
+        </p:spPr>
+        <p:txBody>
+          <a:bodyPr/>
+          <a:lstStyle/>
+          <a:p>
+            <a:r>
+              <a:rPr lang="en-US"/>
+              <a:t>Click to edit Master title style</a:t>
+            </a:r>
+          </a:p>
+        </p:txBody>
+      </p:sp>
+      <p:sp>
+        <p:nvSpPr>
+          <p:cNvPr id="7" name="Text Placeholder 3">
+            <a:extLst>
+              <a:ext uri="{FF2B5EF4-FFF2-40B4-BE49-F238E27FC236}">
+                <a16:creationId xmlns:a16="http://schemas.microsoft.com/office/drawing/2014/main" id="{03D45574-B30B-4C34-A8B0-D8DC428F3EED}"/>
+              </a:ext>
+            </a:extLst>
+          </p:cNvPr>
+          <p:cNvSpPr>
+            <a:spLocks noGrp="1"/>
+          </p:cNvSpPr>
+          <p:nvPr>
+            <p:ph type="body" sz="quarter" idx="10"/>
+          </p:nvPr>
+        </p:nvSpPr>
+        <p:spPr>
+          <a:xfrm>
+            <a:off x="269240" y="1373694"/>
+            <a:ext cx="11510956" cy="2055306"/>
+          </a:xfrm>
+        </p:spPr>
+        <p:txBody>
+          <a:bodyPr wrap="square">
+            <a:spAutoFit/>
+          </a:bodyPr>
+          <a:lstStyle>
+            <a:lvl1pPr marL="0" indent="0">
+              <a:buNone/>
+              <a:defRPr/>
+            </a:lvl1pPr>
+            <a:lvl2pPr marL="224097" indent="0">
+              <a:buNone/>
+              <a:defRPr/>
+            </a:lvl2pPr>
+            <a:lvl3pPr marL="448193" indent="0">
+              <a:buNone/>
+              <a:defRPr/>
+            </a:lvl3pPr>
+            <a:lvl4pPr marL="672290" indent="0">
+              <a:buNone/>
+              <a:defRPr/>
+            </a:lvl4pPr>
+            <a:lvl5pPr marL="896386" indent="0">
+              <a:buNone/>
+              <a:defRPr/>
+            </a:lvl5pPr>
+          </a:lstStyle>
+          <a:p>
+            <a:pPr lvl="0"/>
+            <a:r>
+              <a:rPr lang="en-US"/>
+              <a:t>Edit Master text styles</a:t>
+            </a:r>
+          </a:p>
+          <a:p>
+            <a:pPr lvl="1"/>
+            <a:r>
+              <a:rPr lang="en-US"/>
+              <a:t>Second level</a:t>
+            </a:r>
+          </a:p>
+          <a:p>
+            <a:pPr lvl="2"/>
+            <a:r>
+              <a:rPr lang="en-US"/>
+              <a:t>Third level</a:t>
+            </a:r>
+          </a:p>
+          <a:p>
+            <a:pPr lvl="3"/>
+            <a:r>
+              <a:rPr lang="en-US"/>
+              <a:t>Fourth level</a:t>
+            </a:r>
+          </a:p>
+          <a:p>
+            <a:pPr lvl="4"/>
+            <a:r>
+              <a:rPr lang="en-US"/>
+              <a:t>Fifth level</a:t>
+            </a:r>
+          </a:p>
+        </p:txBody>
+      </p:sp>
+    </p:spTree>
+    <p:extLst>
+      <p:ext uri="{BB962C8B-B14F-4D97-AF65-F5344CB8AC3E}">
+        <p14:creationId xmlns:p14="http://schemas.microsoft.com/office/powerpoint/2010/main" val="3103152217"/>
+      </p:ext>
+    </p:extLst>
+  </p:cSld>
+  <p:clrMapOvr>
+    <a:masterClrMapping/>
+  </p:clrMapOvr>
+  <mc:AlternateContent xmlns:mc="http://schemas.openxmlformats.org/markup-compatibility/2006" xmlns:p14="http://schemas.microsoft.com/office/powerpoint/2010/main">
+    <mc:Choice Requires="p14">
+      <p:transition spd="med" p14:dur="700">
+        <p:fade/>
+      </p:transition>
+    </mc:Choice>
+    <mc:Fallback xmlns="">
+      <p:transition spd="med">
+        <p:fade/>
+      </p:transition>
+    </mc:Fallback>
+  </mc:AlternateContent>
+</p:sldLayout>
+</file>
+
+<file path=ppt/slideLayouts/slideLayout5.xml><?xml version="1.0" encoding="utf-8"?>
 <p:sldLayout xmlns:a="http://schemas.openxmlformats.org/drawingml/2006/main" xmlns:r="http://schemas.openxmlformats.org/officeDocument/2006/relationships" xmlns:p="http://schemas.openxmlformats.org/presentationml/2006/main" preserve="1">
   <p:cSld name="Section Title Plain">
     <p:bg>
@@ -11566,7 +12238,7 @@
 </p:sldLayout>
 </file>
 
-<file path=ppt/slideLayouts/slideLayout5.xml><?xml version="1.0" encoding="utf-8"?>
+<file path=ppt/slideLayouts/slideLayout6.xml><?xml version="1.0" encoding="utf-8"?>
 <p:sldLayout xmlns:a="http://schemas.openxmlformats.org/drawingml/2006/main" xmlns:r="http://schemas.openxmlformats.org/officeDocument/2006/relationships" xmlns:p="http://schemas.openxmlformats.org/presentationml/2006/main" preserve="1">
   <p:cSld name="Blank Purple">
     <p:bg>
@@ -11607,7 +12279,37 @@
 </p:sldLayout>
 </file>
 
-<file path=ppt/slideLayouts/slideLayout6.xml><?xml version="1.0" encoding="utf-8"?>
+<file path=ppt/slideLayouts/slideLayout7.xml><?xml version="1.0" encoding="utf-8"?>
+<p:sldLayout xmlns:a="http://schemas.openxmlformats.org/drawingml/2006/main" xmlns:r="http://schemas.openxmlformats.org/officeDocument/2006/relationships" xmlns:p="http://schemas.openxmlformats.org/presentationml/2006/main" type="blank">
+  <p:cSld name="Blank">
+    <p:spTree>
+      <p:nvGrpSpPr>
+        <p:cNvPr id="1" name=""/>
+        <p:cNvGrpSpPr/>
+        <p:nvPr/>
+      </p:nvGrpSpPr>
+      <p:grpSpPr>
+        <a:xfrm>
+          <a:off x="0" y="0"/>
+          <a:ext cx="0" cy="0"/>
+          <a:chOff x="0" y="0"/>
+          <a:chExt cx="0" cy="0"/>
+        </a:xfrm>
+      </p:grpSpPr>
+    </p:spTree>
+    <p:extLst>
+      <p:ext uri="{BB962C8B-B14F-4D97-AF65-F5344CB8AC3E}">
+        <p14:creationId xmlns:p14="http://schemas.microsoft.com/office/powerpoint/2010/main" val="3411214405"/>
+      </p:ext>
+    </p:extLst>
+  </p:cSld>
+  <p:clrMapOvr>
+    <a:masterClrMapping/>
+  </p:clrMapOvr>
+</p:sldLayout>
+</file>
+
+<file path=ppt/slideLayouts/slideLayout8.xml><?xml version="1.0" encoding="utf-8"?>
 <p:sldLayout xmlns:a="http://schemas.openxmlformats.org/drawingml/2006/main" xmlns:r="http://schemas.openxmlformats.org/officeDocument/2006/relationships" xmlns:p="http://schemas.openxmlformats.org/presentationml/2006/main" preserve="1">
   <p:cSld name="1_Video slide">
     <p:bg>
@@ -11809,7 +12511,7 @@
 </p:sldLayout>
 </file>
 
-<file path=ppt/slideLayouts/slideLayout7.xml><?xml version="1.0" encoding="utf-8"?>
+<file path=ppt/slideLayouts/slideLayout9.xml><?xml version="1.0" encoding="utf-8"?>
 <p:sldLayout xmlns:a="http://schemas.openxmlformats.org/drawingml/2006/main" xmlns:r="http://schemas.openxmlformats.org/officeDocument/2006/relationships" xmlns:p="http://schemas.openxmlformats.org/presentationml/2006/main" preserve="1">
   <p:cSld name="Video slide">
     <p:bg>
@@ -11911,190 +12613,6 @@
     </mc:Choice>
     <mc:Fallback xmlns="">
       <p:transition spd="slow">
-        <p:fade/>
-      </p:transition>
-    </mc:Fallback>
-  </mc:AlternateContent>
-</p:sldLayout>
-</file>
-
-<file path=ppt/slideLayouts/slideLayout8.xml><?xml version="1.0" encoding="utf-8"?>
-<p:sldLayout xmlns:a="http://schemas.openxmlformats.org/drawingml/2006/main" xmlns:r="http://schemas.openxmlformats.org/officeDocument/2006/relationships" xmlns:p="http://schemas.openxmlformats.org/presentationml/2006/main" type="blank">
-  <p:cSld name="Blank">
-    <p:spTree>
-      <p:nvGrpSpPr>
-        <p:cNvPr id="1" name=""/>
-        <p:cNvGrpSpPr/>
-        <p:nvPr/>
-      </p:nvGrpSpPr>
-      <p:grpSpPr>
-        <a:xfrm>
-          <a:off x="0" y="0"/>
-          <a:ext cx="0" cy="0"/>
-          <a:chOff x="0" y="0"/>
-          <a:chExt cx="0" cy="0"/>
-        </a:xfrm>
-      </p:grpSpPr>
-    </p:spTree>
-    <p:extLst>
-      <p:ext uri="{BB962C8B-B14F-4D97-AF65-F5344CB8AC3E}">
-        <p14:creationId xmlns:p14="http://schemas.microsoft.com/office/powerpoint/2010/main" val="3411214405"/>
-      </p:ext>
-    </p:extLst>
-  </p:cSld>
-  <p:clrMapOvr>
-    <a:masterClrMapping/>
-  </p:clrMapOvr>
-</p:sldLayout>
-</file>
-
-<file path=ppt/slideLayouts/slideLayout9.xml><?xml version="1.0" encoding="utf-8"?>
-<p:sldLayout xmlns:a="http://schemas.openxmlformats.org/drawingml/2006/main" xmlns:r="http://schemas.openxmlformats.org/officeDocument/2006/relationships" xmlns:p="http://schemas.openxmlformats.org/presentationml/2006/main" userDrawn="1">
-  <p:cSld name="Title &amp; Non-bulleted text">
-    <p:spTree>
-      <p:nvGrpSpPr>
-        <p:cNvPr id="1" name=""/>
-        <p:cNvGrpSpPr/>
-        <p:nvPr/>
-      </p:nvGrpSpPr>
-      <p:grpSpPr>
-        <a:xfrm>
-          <a:off x="0" y="0"/>
-          <a:ext cx="0" cy="0"/>
-          <a:chOff x="0" y="0"/>
-          <a:chExt cx="0" cy="0"/>
-        </a:xfrm>
-      </p:grpSpPr>
-      <p:sp>
-        <p:nvSpPr>
-          <p:cNvPr id="2" name="Title 1"/>
-          <p:cNvSpPr>
-            <a:spLocks noGrp="1"/>
-          </p:cNvSpPr>
-          <p:nvPr>
-            <p:ph type="title"/>
-          </p:nvPr>
-        </p:nvSpPr>
-        <p:spPr>
-          <a:xfrm>
-            <a:off x="269240" y="289511"/>
-            <a:ext cx="6797886" cy="899665"/>
-          </a:xfrm>
-        </p:spPr>
-        <p:txBody>
-          <a:bodyPr/>
-          <a:lstStyle/>
-          <a:p>
-            <a:r>
-              <a:rPr lang="en-US"/>
-              <a:t>Click to edit Master title style</a:t>
-            </a:r>
-          </a:p>
-        </p:txBody>
-      </p:sp>
-      <p:sp>
-        <p:nvSpPr>
-          <p:cNvPr id="7" name="Text Placeholder 3">
-            <a:extLst>
-              <a:ext uri="{FF2B5EF4-FFF2-40B4-BE49-F238E27FC236}">
-                <a16:creationId xmlns:a16="http://schemas.microsoft.com/office/drawing/2014/main" id="{03D45574-B30B-4C34-A8B0-D8DC428F3EED}"/>
-              </a:ext>
-            </a:extLst>
-          </p:cNvPr>
-          <p:cNvSpPr>
-            <a:spLocks noGrp="1"/>
-          </p:cNvSpPr>
-          <p:nvPr>
-            <p:ph type="body" sz="quarter" idx="10"/>
-          </p:nvPr>
-        </p:nvSpPr>
-        <p:spPr>
-          <a:xfrm>
-            <a:off x="269240" y="1860034"/>
-            <a:ext cx="6723185" cy="2263268"/>
-          </a:xfrm>
-        </p:spPr>
-        <p:txBody>
-          <a:bodyPr wrap="square">
-            <a:spAutoFit/>
-          </a:bodyPr>
-          <a:lstStyle>
-            <a:lvl1pPr marL="0" indent="0">
-              <a:buNone/>
-              <a:defRPr/>
-            </a:lvl1pPr>
-            <a:lvl2pPr marL="224097" indent="0">
-              <a:buNone/>
-              <a:defRPr/>
-            </a:lvl2pPr>
-            <a:lvl3pPr marL="448193" indent="0">
-              <a:buNone/>
-              <a:defRPr/>
-            </a:lvl3pPr>
-            <a:lvl4pPr marL="672290" indent="0">
-              <a:buNone/>
-              <a:defRPr/>
-            </a:lvl4pPr>
-            <a:lvl5pPr marL="896386" indent="0">
-              <a:buNone/>
-              <a:defRPr/>
-            </a:lvl5pPr>
-          </a:lstStyle>
-          <a:p>
-            <a:pPr lvl="0"/>
-            <a:r>
-              <a:rPr lang="en-US"/>
-              <a:t>Edit Master text styles</a:t>
-            </a:r>
-          </a:p>
-          <a:p>
-            <a:pPr lvl="1"/>
-            <a:r>
-              <a:rPr lang="en-US"/>
-              <a:t>Second level</a:t>
-            </a:r>
-          </a:p>
-          <a:p>
-            <a:pPr lvl="2"/>
-            <a:r>
-              <a:rPr lang="en-US"/>
-              <a:t>Third level</a:t>
-            </a:r>
-          </a:p>
-          <a:p>
-            <a:pPr lvl="3"/>
-            <a:r>
-              <a:rPr lang="en-US"/>
-              <a:t>Fourth level</a:t>
-            </a:r>
-          </a:p>
-          <a:p>
-            <a:pPr lvl="4"/>
-            <a:r>
-              <a:rPr lang="en-US"/>
-              <a:t>Fifth level</a:t>
-            </a:r>
-          </a:p>
-        </p:txBody>
-      </p:sp>
-    </p:spTree>
-    <p:extLst>
-      <p:ext uri="{BB962C8B-B14F-4D97-AF65-F5344CB8AC3E}">
-        <p14:creationId xmlns:p14="http://schemas.microsoft.com/office/powerpoint/2010/main" val="3103152217"/>
-      </p:ext>
-    </p:extLst>
-  </p:cSld>
-  <p:clrMapOvr>
-    <a:masterClrMapping/>
-  </p:clrMapOvr>
-  <mc:AlternateContent xmlns:mc="http://schemas.openxmlformats.org/markup-compatibility/2006" xmlns:p14="http://schemas.microsoft.com/office/powerpoint/2010/main">
-    <mc:Choice Requires="p14">
-      <p:transition spd="med" p14:dur="700">
-        <p:fade/>
-      </p:transition>
-    </mc:Choice>
-    <mc:Fallback xmlns="">
-      <p:transition spd="med">
         <p:fade/>
       </p:transition>
     </mc:Fallback>
@@ -13796,12 +14314,12 @@
     <p:sldLayoutId id="2147483736" r:id="rId1"/>
     <p:sldLayoutId id="2147483737" r:id="rId2"/>
     <p:sldLayoutId id="2147483718" r:id="rId3"/>
-    <p:sldLayoutId id="2147483725" r:id="rId4"/>
-    <p:sldLayoutId id="2147483726" r:id="rId5"/>
-    <p:sldLayoutId id="2147483742" r:id="rId6"/>
-    <p:sldLayoutId id="2147483741" r:id="rId7"/>
-    <p:sldLayoutId id="2147483746" r:id="rId8"/>
-    <p:sldLayoutId id="2147483733" r:id="rId9"/>
+    <p:sldLayoutId id="2147483733" r:id="rId4"/>
+    <p:sldLayoutId id="2147483725" r:id="rId5"/>
+    <p:sldLayoutId id="2147483726" r:id="rId6"/>
+    <p:sldLayoutId id="2147483746" r:id="rId7"/>
+    <p:sldLayoutId id="2147483742" r:id="rId8"/>
+    <p:sldLayoutId id="2147483741" r:id="rId9"/>
     <p:sldLayoutId id="2147483751" r:id="rId10"/>
   </p:sldLayoutIdLst>
   <p:transition>
@@ -36374,7 +36892,7 @@
 </file>
 
 <file path=ppt/slides/slide6.xml><?xml version="1.0" encoding="utf-8"?>
-<p:sld xmlns:a="http://schemas.openxmlformats.org/drawingml/2006/main" xmlns:r="http://schemas.openxmlformats.org/officeDocument/2006/relationships" xmlns:p="http://schemas.openxmlformats.org/presentationml/2006/main">
+<p:sld xmlns:a="http://schemas.openxmlformats.org/drawingml/2006/main" xmlns:r="http://schemas.openxmlformats.org/officeDocument/2006/relationships" xmlns:p="http://schemas.openxmlformats.org/presentationml/2006/main" showMasterSp="0">
   <p:cSld>
     <p:spTree>
       <p:nvGrpSpPr>
@@ -36490,7 +37008,7 @@
 </file>
 
 <file path=ppt/slides/slide7.xml><?xml version="1.0" encoding="utf-8"?>
-<p:sld xmlns:a="http://schemas.openxmlformats.org/drawingml/2006/main" xmlns:r="http://schemas.openxmlformats.org/officeDocument/2006/relationships" xmlns:p="http://schemas.openxmlformats.org/presentationml/2006/main">
+<p:sld xmlns:a="http://schemas.openxmlformats.org/drawingml/2006/main" xmlns:r="http://schemas.openxmlformats.org/officeDocument/2006/relationships" xmlns:p="http://schemas.openxmlformats.org/presentationml/2006/main" showMasterSp="0">
   <p:cSld>
     <p:spTree>
       <p:nvGrpSpPr>
@@ -38779,22 +39297,317 @@
 </a:theme>
 </file>
 
+<file path=ppt/theme/theme3.xml><?xml version="1.0" encoding="utf-8"?>
+<a:theme xmlns:a="http://schemas.openxmlformats.org/drawingml/2006/main" name="Office Theme">
+  <a:themeElements>
+    <a:clrScheme name="Office">
+      <a:dk1>
+        <a:sysClr val="windowText" lastClr="000000"/>
+      </a:dk1>
+      <a:lt1>
+        <a:sysClr val="window" lastClr="FFFFFF"/>
+      </a:lt1>
+      <a:dk2>
+        <a:srgbClr val="44546A"/>
+      </a:dk2>
+      <a:lt2>
+        <a:srgbClr val="E7E6E6"/>
+      </a:lt2>
+      <a:accent1>
+        <a:srgbClr val="4472C4"/>
+      </a:accent1>
+      <a:accent2>
+        <a:srgbClr val="ED7D31"/>
+      </a:accent2>
+      <a:accent3>
+        <a:srgbClr val="A5A5A5"/>
+      </a:accent3>
+      <a:accent4>
+        <a:srgbClr val="FFC000"/>
+      </a:accent4>
+      <a:accent5>
+        <a:srgbClr val="5B9BD5"/>
+      </a:accent5>
+      <a:accent6>
+        <a:srgbClr val="70AD47"/>
+      </a:accent6>
+      <a:hlink>
+        <a:srgbClr val="0563C1"/>
+      </a:hlink>
+      <a:folHlink>
+        <a:srgbClr val="954F72"/>
+      </a:folHlink>
+    </a:clrScheme>
+    <a:fontScheme name="Office">
+      <a:majorFont>
+        <a:latin typeface="Calibri Light" panose="020F0302020204030204"/>
+        <a:ea typeface=""/>
+        <a:cs typeface=""/>
+        <a:font script="Jpan" typeface="游ゴシック Light"/>
+        <a:font script="Hang" typeface="맑은 고딕"/>
+        <a:font script="Hans" typeface="等线 Light"/>
+        <a:font script="Hant" typeface="新細明體"/>
+        <a:font script="Arab" typeface="Times New Roman"/>
+        <a:font script="Hebr" typeface="Times New Roman"/>
+        <a:font script="Thai" typeface="Angsana New"/>
+        <a:font script="Ethi" typeface="Nyala"/>
+        <a:font script="Beng" typeface="Vrinda"/>
+        <a:font script="Gujr" typeface="Shruti"/>
+        <a:font script="Khmr" typeface="MoolBoran"/>
+        <a:font script="Knda" typeface="Tunga"/>
+        <a:font script="Guru" typeface="Raavi"/>
+        <a:font script="Cans" typeface="Euphemia"/>
+        <a:font script="Cher" typeface="Plantagenet Cherokee"/>
+        <a:font script="Yiii" typeface="Microsoft Yi Baiti"/>
+        <a:font script="Tibt" typeface="Microsoft Himalaya"/>
+        <a:font script="Thaa" typeface="MV Boli"/>
+        <a:font script="Deva" typeface="Mangal"/>
+        <a:font script="Telu" typeface="Gautami"/>
+        <a:font script="Taml" typeface="Latha"/>
+        <a:font script="Syrc" typeface="Estrangelo Edessa"/>
+        <a:font script="Orya" typeface="Kalinga"/>
+        <a:font script="Mlym" typeface="Kartika"/>
+        <a:font script="Laoo" typeface="DokChampa"/>
+        <a:font script="Sinh" typeface="Iskoola Pota"/>
+        <a:font script="Mong" typeface="Mongolian Baiti"/>
+        <a:font script="Viet" typeface="Times New Roman"/>
+        <a:font script="Uigh" typeface="Microsoft Uighur"/>
+        <a:font script="Geor" typeface="Sylfaen"/>
+        <a:font script="Armn" typeface="Arial"/>
+        <a:font script="Bugi" typeface="Leelawadee UI"/>
+        <a:font script="Bopo" typeface="Microsoft JhengHei"/>
+        <a:font script="Java" typeface="Javanese Text"/>
+        <a:font script="Lisu" typeface="Segoe UI"/>
+        <a:font script="Mymr" typeface="Myanmar Text"/>
+        <a:font script="Nkoo" typeface="Ebrima"/>
+        <a:font script="Olck" typeface="Nirmala UI"/>
+        <a:font script="Osma" typeface="Ebrima"/>
+        <a:font script="Phag" typeface="Phagspa"/>
+        <a:font script="Syrn" typeface="Estrangelo Edessa"/>
+        <a:font script="Syrj" typeface="Estrangelo Edessa"/>
+        <a:font script="Syre" typeface="Estrangelo Edessa"/>
+        <a:font script="Sora" typeface="Nirmala UI"/>
+        <a:font script="Tale" typeface="Microsoft Tai Le"/>
+        <a:font script="Talu" typeface="Microsoft New Tai Lue"/>
+        <a:font script="Tfng" typeface="Ebrima"/>
+      </a:majorFont>
+      <a:minorFont>
+        <a:latin typeface="Calibri" panose="020F0502020204030204"/>
+        <a:ea typeface=""/>
+        <a:cs typeface=""/>
+        <a:font script="Jpan" typeface="游ゴシック"/>
+        <a:font script="Hang" typeface="맑은 고딕"/>
+        <a:font script="Hans" typeface="等线"/>
+        <a:font script="Hant" typeface="新細明體"/>
+        <a:font script="Arab" typeface="Arial"/>
+        <a:font script="Hebr" typeface="Arial"/>
+        <a:font script="Thai" typeface="Cordia New"/>
+        <a:font script="Ethi" typeface="Nyala"/>
+        <a:font script="Beng" typeface="Vrinda"/>
+        <a:font script="Gujr" typeface="Shruti"/>
+        <a:font script="Khmr" typeface="DaunPenh"/>
+        <a:font script="Knda" typeface="Tunga"/>
+        <a:font script="Guru" typeface="Raavi"/>
+        <a:font script="Cans" typeface="Euphemia"/>
+        <a:font script="Cher" typeface="Plantagenet Cherokee"/>
+        <a:font script="Yiii" typeface="Microsoft Yi Baiti"/>
+        <a:font script="Tibt" typeface="Microsoft Himalaya"/>
+        <a:font script="Thaa" typeface="MV Boli"/>
+        <a:font script="Deva" typeface="Mangal"/>
+        <a:font script="Telu" typeface="Gautami"/>
+        <a:font script="Taml" typeface="Latha"/>
+        <a:font script="Syrc" typeface="Estrangelo Edessa"/>
+        <a:font script="Orya" typeface="Kalinga"/>
+        <a:font script="Mlym" typeface="Kartika"/>
+        <a:font script="Laoo" typeface="DokChampa"/>
+        <a:font script="Sinh" typeface="Iskoola Pota"/>
+        <a:font script="Mong" typeface="Mongolian Baiti"/>
+        <a:font script="Viet" typeface="Arial"/>
+        <a:font script="Uigh" typeface="Microsoft Uighur"/>
+        <a:font script="Geor" typeface="Sylfaen"/>
+        <a:font script="Armn" typeface="Arial"/>
+        <a:font script="Bugi" typeface="Leelawadee UI"/>
+        <a:font script="Bopo" typeface="Microsoft JhengHei"/>
+        <a:font script="Java" typeface="Javanese Text"/>
+        <a:font script="Lisu" typeface="Segoe UI"/>
+        <a:font script="Mymr" typeface="Myanmar Text"/>
+        <a:font script="Nkoo" typeface="Ebrima"/>
+        <a:font script="Olck" typeface="Nirmala UI"/>
+        <a:font script="Osma" typeface="Ebrima"/>
+        <a:font script="Phag" typeface="Phagspa"/>
+        <a:font script="Syrn" typeface="Estrangelo Edessa"/>
+        <a:font script="Syrj" typeface="Estrangelo Edessa"/>
+        <a:font script="Syre" typeface="Estrangelo Edessa"/>
+        <a:font script="Sora" typeface="Nirmala UI"/>
+        <a:font script="Tale" typeface="Microsoft Tai Le"/>
+        <a:font script="Talu" typeface="Microsoft New Tai Lue"/>
+        <a:font script="Tfng" typeface="Ebrima"/>
+      </a:minorFont>
+    </a:fontScheme>
+    <a:fmtScheme name="Office">
+      <a:fillStyleLst>
+        <a:solidFill>
+          <a:schemeClr val="phClr"/>
+        </a:solidFill>
+        <a:gradFill rotWithShape="1">
+          <a:gsLst>
+            <a:gs pos="0">
+              <a:schemeClr val="phClr">
+                <a:lumMod val="110000"/>
+                <a:satMod val="105000"/>
+                <a:tint val="67000"/>
+              </a:schemeClr>
+            </a:gs>
+            <a:gs pos="50000">
+              <a:schemeClr val="phClr">
+                <a:lumMod val="105000"/>
+                <a:satMod val="103000"/>
+                <a:tint val="73000"/>
+              </a:schemeClr>
+            </a:gs>
+            <a:gs pos="100000">
+              <a:schemeClr val="phClr">
+                <a:lumMod val="105000"/>
+                <a:satMod val="109000"/>
+                <a:tint val="81000"/>
+              </a:schemeClr>
+            </a:gs>
+          </a:gsLst>
+          <a:lin ang="5400000" scaled="0"/>
+        </a:gradFill>
+        <a:gradFill rotWithShape="1">
+          <a:gsLst>
+            <a:gs pos="0">
+              <a:schemeClr val="phClr">
+                <a:satMod val="103000"/>
+                <a:lumMod val="102000"/>
+                <a:tint val="94000"/>
+              </a:schemeClr>
+            </a:gs>
+            <a:gs pos="50000">
+              <a:schemeClr val="phClr">
+                <a:satMod val="110000"/>
+                <a:lumMod val="100000"/>
+                <a:shade val="100000"/>
+              </a:schemeClr>
+            </a:gs>
+            <a:gs pos="100000">
+              <a:schemeClr val="phClr">
+                <a:lumMod val="99000"/>
+                <a:satMod val="120000"/>
+                <a:shade val="78000"/>
+              </a:schemeClr>
+            </a:gs>
+          </a:gsLst>
+          <a:lin ang="5400000" scaled="0"/>
+        </a:gradFill>
+      </a:fillStyleLst>
+      <a:lnStyleLst>
+        <a:ln w="6350" cap="flat" cmpd="sng" algn="ctr">
+          <a:solidFill>
+            <a:schemeClr val="phClr"/>
+          </a:solidFill>
+          <a:prstDash val="solid"/>
+          <a:miter lim="800000"/>
+        </a:ln>
+        <a:ln w="12700" cap="flat" cmpd="sng" algn="ctr">
+          <a:solidFill>
+            <a:schemeClr val="phClr"/>
+          </a:solidFill>
+          <a:prstDash val="solid"/>
+          <a:miter lim="800000"/>
+        </a:ln>
+        <a:ln w="19050" cap="flat" cmpd="sng" algn="ctr">
+          <a:solidFill>
+            <a:schemeClr val="phClr"/>
+          </a:solidFill>
+          <a:prstDash val="solid"/>
+          <a:miter lim="800000"/>
+        </a:ln>
+      </a:lnStyleLst>
+      <a:effectStyleLst>
+        <a:effectStyle>
+          <a:effectLst/>
+        </a:effectStyle>
+        <a:effectStyle>
+          <a:effectLst/>
+        </a:effectStyle>
+        <a:effectStyle>
+          <a:effectLst>
+            <a:outerShdw blurRad="57150" dist="19050" dir="5400000" algn="ctr" rotWithShape="0">
+              <a:srgbClr val="000000">
+                <a:alpha val="63000"/>
+              </a:srgbClr>
+            </a:outerShdw>
+          </a:effectLst>
+        </a:effectStyle>
+      </a:effectStyleLst>
+      <a:bgFillStyleLst>
+        <a:solidFill>
+          <a:schemeClr val="phClr"/>
+        </a:solidFill>
+        <a:solidFill>
+          <a:schemeClr val="phClr">
+            <a:tint val="95000"/>
+            <a:satMod val="170000"/>
+          </a:schemeClr>
+        </a:solidFill>
+        <a:gradFill rotWithShape="1">
+          <a:gsLst>
+            <a:gs pos="0">
+              <a:schemeClr val="phClr">
+                <a:tint val="93000"/>
+                <a:satMod val="150000"/>
+                <a:shade val="98000"/>
+                <a:lumMod val="102000"/>
+              </a:schemeClr>
+            </a:gs>
+            <a:gs pos="50000">
+              <a:schemeClr val="phClr">
+                <a:tint val="98000"/>
+                <a:satMod val="130000"/>
+                <a:shade val="90000"/>
+                <a:lumMod val="103000"/>
+              </a:schemeClr>
+            </a:gs>
+            <a:gs pos="100000">
+              <a:schemeClr val="phClr">
+                <a:shade val="63000"/>
+                <a:satMod val="120000"/>
+              </a:schemeClr>
+            </a:gs>
+          </a:gsLst>
+          <a:lin ang="5400000" scaled="0"/>
+        </a:gradFill>
+      </a:bgFillStyleLst>
+    </a:fmtScheme>
+  </a:themeElements>
+  <a:objectDefaults/>
+  <a:extraClrSchemeLst/>
+  <a:extLst>
+    <a:ext uri="{05A4C25C-085E-4340-85A3-A5531E510DB2}">
+      <thm15:themeFamily xmlns:thm15="http://schemas.microsoft.com/office/thememl/2012/main" name="Office Theme" id="{62F939B6-93AF-4DB8-9C6B-D6C7DFDC589F}" vid="{4A3C46E8-61CC-4603-A589-7422A47A8E4A}"/>
+    </a:ext>
+  </a:extLst>
+</a:theme>
+</file>
+
 <file path=customXml/item1.xml><?xml version="1.0" encoding="utf-8"?>
+<?mso-contentType ?>
+<FormTemplates xmlns="http://schemas.microsoft.com/sharepoint/v3/contenttype/forms">
+  <Display>DocumentLibraryForm</Display>
+  <Edit>DocumentLibraryForm</Edit>
+  <New>DocumentLibraryForm</New>
+</FormTemplates>
+</file>
+
+<file path=customXml/item2.xml><?xml version="1.0" encoding="utf-8"?>
 <p:properties xmlns:p="http://schemas.microsoft.com/office/2006/metadata/properties" xmlns:xsi="http://www.w3.org/2001/XMLSchema-instance" xmlns:pc="http://schemas.microsoft.com/office/infopath/2007/PartnerControls">
   <documentManagement>
     <_ip_UnifiedCompliancePolicyProperties xmlns="http://schemas.microsoft.com/sharepoint/v3" xsi:nil="true"/>
     <_ip_UnifiedCompliancePolicyUIAction xmlns="http://schemas.microsoft.com/sharepoint/v3" xsi:nil="true"/>
   </documentManagement>
 </p:properties>
-</file>
-
-<file path=customXml/item2.xml><?xml version="1.0" encoding="utf-8"?>
-<?mso-contentType ?>
-<FormTemplates xmlns="http://schemas.microsoft.com/sharepoint/v3/contenttype/forms">
-  <Display>DocumentLibraryForm</Display>
-  <Edit>DocumentLibraryForm</Edit>
-  <New>DocumentLibraryForm</New>
-</FormTemplates>
 </file>
 
 <file path=customXml/item3.xml><?xml version="1.0" encoding="utf-8"?>
@@ -39006,27 +39819,27 @@
 </file>
 
 <file path=customXml/itemProps1.xml><?xml version="1.0" encoding="utf-8"?>
-<ds:datastoreItem xmlns:ds="http://schemas.openxmlformats.org/officeDocument/2006/customXml" ds:itemID="{D23E43D6-DB2F-4C33-A8C8-D28F777A5DE7}">
+<ds:datastoreItem xmlns:ds="http://schemas.openxmlformats.org/officeDocument/2006/customXml" ds:itemID="{093821A7-5528-48BE-BD00-067FBFDD28D5}">
   <ds:schemaRefs>
-    <ds:schemaRef ds:uri="http://purl.org/dc/terms/"/>
-    <ds:schemaRef ds:uri="http://schemas.microsoft.com/office/2006/documentManagement/types"/>
-    <ds:schemaRef ds:uri="569b343d-e775-480b-9b2b-6a6986deb9b0"/>
-    <ds:schemaRef ds:uri="http://schemas.microsoft.com/office/infopath/2007/PartnerControls"/>
-    <ds:schemaRef ds:uri="http://purl.org/dc/elements/1.1/"/>
-    <ds:schemaRef ds:uri="http://schemas.microsoft.com/office/2006/metadata/properties"/>
-    <ds:schemaRef ds:uri="http://schemas.openxmlformats.org/package/2006/metadata/core-properties"/>
-    <ds:schemaRef ds:uri="11245976-3b4d-4794-a754-317688483df2"/>
-    <ds:schemaRef ds:uri="http://schemas.microsoft.com/sharepoint/v3"/>
-    <ds:schemaRef ds:uri="http://www.w3.org/XML/1998/namespace"/>
-    <ds:schemaRef ds:uri="http://purl.org/dc/dcmitype/"/>
+    <ds:schemaRef ds:uri="http://schemas.microsoft.com/sharepoint/v3/contenttype/forms"/>
   </ds:schemaRefs>
 </ds:datastoreItem>
 </file>
 
 <file path=customXml/itemProps2.xml><?xml version="1.0" encoding="utf-8"?>
-<ds:datastoreItem xmlns:ds="http://schemas.openxmlformats.org/officeDocument/2006/customXml" ds:itemID="{093821A7-5528-48BE-BD00-067FBFDD28D5}">
+<ds:datastoreItem xmlns:ds="http://schemas.openxmlformats.org/officeDocument/2006/customXml" ds:itemID="{D23E43D6-DB2F-4C33-A8C8-D28F777A5DE7}">
   <ds:schemaRefs>
-    <ds:schemaRef ds:uri="http://schemas.microsoft.com/sharepoint/v3/contenttype/forms"/>
+    <ds:schemaRef ds:uri="http://schemas.microsoft.com/office/2006/metadata/properties"/>
+    <ds:schemaRef ds:uri="11245976-3b4d-4794-a754-317688483df2"/>
+    <ds:schemaRef ds:uri="http://schemas.microsoft.com/sharepoint/v3"/>
+    <ds:schemaRef ds:uri="http://purl.org/dc/terms/"/>
+    <ds:schemaRef ds:uri="http://schemas.microsoft.com/office/2006/documentManagement/types"/>
+    <ds:schemaRef ds:uri="http://schemas.microsoft.com/office/infopath/2007/PartnerControls"/>
+    <ds:schemaRef ds:uri="http://schemas.openxmlformats.org/package/2006/metadata/core-properties"/>
+    <ds:schemaRef ds:uri="http://purl.org/dc/elements/1.1/"/>
+    <ds:schemaRef ds:uri="569b343d-e775-480b-9b2b-6a6986deb9b0"/>
+    <ds:schemaRef ds:uri="http://www.w3.org/XML/1998/namespace"/>
+    <ds:schemaRef ds:uri="http://purl.org/dc/dcmitype/"/>
   </ds:schemaRefs>
 </ds:datastoreItem>
 </file>

</xml_diff>